<commit_message>
added output dependency form static lib
</commit_message>
<xml_diff>
--- a/cmake_practice/预备讲-Cmake_潘胜利20101026.pptx
+++ b/cmake_practice/预备讲-Cmake_潘胜利20101026.pptx
@@ -272,7 +272,7 @@
           <a:bodyPr lIns="0" rIns="0" tIns="0" bIns="0" anchor="b"/>
           <a:p>
             <a:pPr algn="r"/>
-            <a:fld id="{B98245E2-C8DD-4166-B06E-D45FCECC0C4A}" type="slidenum">
+            <a:fld id="{44957CEB-4A8E-46F8-A612-A059C92295B5}" type="slidenum">
               <a:rPr b="0" lang="en-US" sz="1400" spc="-1" strike="noStrike">
                 <a:solidFill>
                   <a:srgbClr val="000000"/>
@@ -325,7 +325,7 @@
       </p:grpSpPr>
       <p:sp>
         <p:nvSpPr>
-          <p:cNvPr id="176" name="PlaceHolder 1"/>
+          <p:cNvPr id="177" name="PlaceHolder 1"/>
           <p:cNvSpPr>
             <a:spLocks noGrp="1"/>
           </p:cNvSpPr>
@@ -336,7 +336,7 @@
         <p:spPr>
           <a:xfrm>
             <a:off x="710280" y="4925160"/>
-            <a:ext cx="5681880" cy="4028760"/>
+            <a:ext cx="5681520" cy="4028400"/>
           </a:xfrm>
           <a:prstGeom prst="rect">
             <a:avLst/>
@@ -361,14 +361,14 @@
       </p:sp>
       <p:sp>
         <p:nvSpPr>
-          <p:cNvPr id="177" name="CustomShape 2"/>
+          <p:cNvPr id="178" name="CustomShape 2"/>
           <p:cNvSpPr/>
           <p:nvPr/>
         </p:nvSpPr>
         <p:spPr>
           <a:xfrm>
             <a:off x="4023720" y="9720720"/>
-            <a:ext cx="3077280" cy="512280"/>
+            <a:ext cx="3076920" cy="511920"/>
           </a:xfrm>
           <a:prstGeom prst="rect">
             <a:avLst/>
@@ -392,7 +392,7 @@
                 <a:spcPct val="100000"/>
               </a:lnSpc>
             </a:pPr>
-            <a:fld id="{D1BDAD97-8675-41E4-B751-E336D46B8F8E}" type="slidenum">
+            <a:fld id="{E91B0B12-393A-49B9-809B-1D366412C8F2}" type="slidenum">
               <a:rPr b="0" lang="en-US" sz="1200" spc="-1" strike="noStrike">
                 <a:solidFill>
                   <a:srgbClr val="000000"/>
@@ -445,7 +445,7 @@
       </p:grpSpPr>
       <p:sp>
         <p:nvSpPr>
-          <p:cNvPr id="178" name="PlaceHolder 1"/>
+          <p:cNvPr id="179" name="PlaceHolder 1"/>
           <p:cNvSpPr>
             <a:spLocks noGrp="1"/>
           </p:cNvSpPr>
@@ -456,7 +456,7 @@
         <p:spPr>
           <a:xfrm>
             <a:off x="710280" y="4925160"/>
-            <a:ext cx="5681880" cy="4028760"/>
+            <a:ext cx="5681520" cy="4028400"/>
           </a:xfrm>
           <a:prstGeom prst="rect">
             <a:avLst/>
@@ -481,14 +481,14 @@
       </p:sp>
       <p:sp>
         <p:nvSpPr>
-          <p:cNvPr id="179" name="CustomShape 2"/>
+          <p:cNvPr id="180" name="CustomShape 2"/>
           <p:cNvSpPr/>
           <p:nvPr/>
         </p:nvSpPr>
         <p:spPr>
           <a:xfrm>
             <a:off x="4023720" y="9720720"/>
-            <a:ext cx="3077280" cy="512280"/>
+            <a:ext cx="3076920" cy="511920"/>
           </a:xfrm>
           <a:prstGeom prst="rect">
             <a:avLst/>
@@ -512,7 +512,7 @@
                 <a:spcPct val="100000"/>
               </a:lnSpc>
             </a:pPr>
-            <a:fld id="{7AF65685-FB99-447A-A2FC-605E03EE9009}" type="slidenum">
+            <a:fld id="{67F0D6F0-A612-4E85-A8AE-639A5B70C85E}" type="slidenum">
               <a:rPr b="0" lang="en-US" sz="1200" spc="-1" strike="noStrike">
                 <a:solidFill>
                   <a:srgbClr val="000000"/>
@@ -607,7 +607,8 @@
         <p:txBody>
           <a:bodyPr lIns="0" rIns="0" tIns="0" bIns="0" anchor="ctr"/>
           <a:p>
-            <a:endParaRPr b="0" lang="zh-CN" sz="1800" spc="-1" strike="noStrike">
+            <a:pPr algn="ctr"/>
+            <a:endParaRPr b="0" lang="en-US" sz="4400" spc="-1" strike="noStrike">
               <a:solidFill>
                 <a:srgbClr val="000000"/>
               </a:solidFill>
@@ -643,7 +644,7 @@
         <p:txBody>
           <a:bodyPr lIns="0" rIns="0" tIns="0" bIns="0"/>
           <a:p>
-            <a:endParaRPr b="0" lang="zh-CN" sz="2800" spc="-1" strike="noStrike">
+            <a:endParaRPr b="0" lang="en-US" sz="3200" spc="-1" strike="noStrike">
               <a:solidFill>
                 <a:srgbClr val="000000"/>
               </a:solidFill>
@@ -679,7 +680,7 @@
         <p:txBody>
           <a:bodyPr lIns="0" rIns="0" tIns="0" bIns="0"/>
           <a:p>
-            <a:endParaRPr b="0" lang="zh-CN" sz="2800" spc="-1" strike="noStrike">
+            <a:endParaRPr b="0" lang="en-US" sz="3200" spc="-1" strike="noStrike">
               <a:solidFill>
                 <a:srgbClr val="000000"/>
               </a:solidFill>
@@ -737,7 +738,8 @@
         <p:txBody>
           <a:bodyPr lIns="0" rIns="0" tIns="0" bIns="0" anchor="ctr"/>
           <a:p>
-            <a:endParaRPr b="0" lang="zh-CN" sz="1800" spc="-1" strike="noStrike">
+            <a:pPr algn="ctr"/>
+            <a:endParaRPr b="0" lang="en-US" sz="4400" spc="-1" strike="noStrike">
               <a:solidFill>
                 <a:srgbClr val="000000"/>
               </a:solidFill>
@@ -773,7 +775,7 @@
         <p:txBody>
           <a:bodyPr lIns="0" rIns="0" tIns="0" bIns="0"/>
           <a:p>
-            <a:endParaRPr b="0" lang="zh-CN" sz="2800" spc="-1" strike="noStrike">
+            <a:endParaRPr b="0" lang="en-US" sz="3200" spc="-1" strike="noStrike">
               <a:solidFill>
                 <a:srgbClr val="000000"/>
               </a:solidFill>
@@ -809,7 +811,7 @@
         <p:txBody>
           <a:bodyPr lIns="0" rIns="0" tIns="0" bIns="0"/>
           <a:p>
-            <a:endParaRPr b="0" lang="zh-CN" sz="2800" spc="-1" strike="noStrike">
+            <a:endParaRPr b="0" lang="en-US" sz="3200" spc="-1" strike="noStrike">
               <a:solidFill>
                 <a:srgbClr val="000000"/>
               </a:solidFill>
@@ -845,7 +847,7 @@
         <p:txBody>
           <a:bodyPr lIns="0" rIns="0" tIns="0" bIns="0"/>
           <a:p>
-            <a:endParaRPr b="0" lang="zh-CN" sz="2800" spc="-1" strike="noStrike">
+            <a:endParaRPr b="0" lang="en-US" sz="3200" spc="-1" strike="noStrike">
               <a:solidFill>
                 <a:srgbClr val="000000"/>
               </a:solidFill>
@@ -881,7 +883,7 @@
         <p:txBody>
           <a:bodyPr lIns="0" rIns="0" tIns="0" bIns="0"/>
           <a:p>
-            <a:endParaRPr b="0" lang="zh-CN" sz="2800" spc="-1" strike="noStrike">
+            <a:endParaRPr b="0" lang="en-US" sz="3200" spc="-1" strike="noStrike">
               <a:solidFill>
                 <a:srgbClr val="000000"/>
               </a:solidFill>
@@ -939,7 +941,8 @@
         <p:txBody>
           <a:bodyPr lIns="0" rIns="0" tIns="0" bIns="0" anchor="ctr"/>
           <a:p>
-            <a:endParaRPr b="0" lang="zh-CN" sz="1800" spc="-1" strike="noStrike">
+            <a:pPr algn="ctr"/>
+            <a:endParaRPr b="0" lang="en-US" sz="4400" spc="-1" strike="noStrike">
               <a:solidFill>
                 <a:srgbClr val="000000"/>
               </a:solidFill>
@@ -975,7 +978,7 @@
         <p:txBody>
           <a:bodyPr lIns="0" rIns="0" tIns="0" bIns="0"/>
           <a:p>
-            <a:endParaRPr b="0" lang="zh-CN" sz="2800" spc="-1" strike="noStrike">
+            <a:endParaRPr b="0" lang="en-US" sz="3200" spc="-1" strike="noStrike">
               <a:solidFill>
                 <a:srgbClr val="000000"/>
               </a:solidFill>
@@ -1011,7 +1014,7 @@
         <p:txBody>
           <a:bodyPr lIns="0" rIns="0" tIns="0" bIns="0"/>
           <a:p>
-            <a:endParaRPr b="0" lang="zh-CN" sz="2800" spc="-1" strike="noStrike">
+            <a:endParaRPr b="0" lang="en-US" sz="3200" spc="-1" strike="noStrike">
               <a:solidFill>
                 <a:srgbClr val="000000"/>
               </a:solidFill>
@@ -1137,7 +1140,8 @@
         <p:txBody>
           <a:bodyPr lIns="0" rIns="0" tIns="0" bIns="0" anchor="ctr"/>
           <a:p>
-            <a:endParaRPr b="0" lang="zh-CN" sz="1800" spc="-1" strike="noStrike">
+            <a:pPr algn="ctr"/>
+            <a:endParaRPr b="0" lang="en-US" sz="4400" spc="-1" strike="noStrike">
               <a:solidFill>
                 <a:srgbClr val="000000"/>
               </a:solidFill>
@@ -1232,7 +1236,8 @@
         <p:txBody>
           <a:bodyPr lIns="0" rIns="0" tIns="0" bIns="0" anchor="ctr"/>
           <a:p>
-            <a:endParaRPr b="0" lang="zh-CN" sz="1800" spc="-1" strike="noStrike">
+            <a:pPr algn="ctr"/>
+            <a:endParaRPr b="0" lang="en-US" sz="4400" spc="-1" strike="noStrike">
               <a:solidFill>
                 <a:srgbClr val="000000"/>
               </a:solidFill>
@@ -1268,7 +1273,7 @@
         <p:txBody>
           <a:bodyPr lIns="0" rIns="0" tIns="0" bIns="0"/>
           <a:p>
-            <a:endParaRPr b="0" lang="zh-CN" sz="2800" spc="-1" strike="noStrike">
+            <a:endParaRPr b="0" lang="en-US" sz="3200" spc="-1" strike="noStrike">
               <a:solidFill>
                 <a:srgbClr val="000000"/>
               </a:solidFill>
@@ -1326,7 +1331,8 @@
         <p:txBody>
           <a:bodyPr lIns="0" rIns="0" tIns="0" bIns="0" anchor="ctr"/>
           <a:p>
-            <a:endParaRPr b="0" lang="zh-CN" sz="1800" spc="-1" strike="noStrike">
+            <a:pPr algn="ctr"/>
+            <a:endParaRPr b="0" lang="en-US" sz="4400" spc="-1" strike="noStrike">
               <a:solidFill>
                 <a:srgbClr val="000000"/>
               </a:solidFill>
@@ -1362,7 +1368,7 @@
         <p:txBody>
           <a:bodyPr lIns="0" rIns="0" tIns="0" bIns="0"/>
           <a:p>
-            <a:endParaRPr b="0" lang="zh-CN" sz="2800" spc="-1" strike="noStrike">
+            <a:endParaRPr b="0" lang="en-US" sz="3200" spc="-1" strike="noStrike">
               <a:solidFill>
                 <a:srgbClr val="000000"/>
               </a:solidFill>
@@ -1398,7 +1404,7 @@
         <p:txBody>
           <a:bodyPr lIns="0" rIns="0" tIns="0" bIns="0"/>
           <a:p>
-            <a:endParaRPr b="0" lang="zh-CN" sz="2800" spc="-1" strike="noStrike">
+            <a:endParaRPr b="0" lang="en-US" sz="3200" spc="-1" strike="noStrike">
               <a:solidFill>
                 <a:srgbClr val="000000"/>
               </a:solidFill>
@@ -1456,7 +1462,8 @@
         <p:txBody>
           <a:bodyPr lIns="0" rIns="0" tIns="0" bIns="0" anchor="ctr"/>
           <a:p>
-            <a:endParaRPr b="0" lang="zh-CN" sz="1800" spc="-1" strike="noStrike">
+            <a:pPr algn="ctr"/>
+            <a:endParaRPr b="0" lang="en-US" sz="4400" spc="-1" strike="noStrike">
               <a:solidFill>
                 <a:srgbClr val="000000"/>
               </a:solidFill>
@@ -1573,7 +1580,8 @@
         <p:txBody>
           <a:bodyPr lIns="0" rIns="0" tIns="0" bIns="0" anchor="ctr"/>
           <a:p>
-            <a:endParaRPr b="0" lang="zh-CN" sz="1800" spc="-1" strike="noStrike">
+            <a:pPr algn="ctr"/>
+            <a:endParaRPr b="0" lang="en-US" sz="4400" spc="-1" strike="noStrike">
               <a:solidFill>
                 <a:srgbClr val="000000"/>
               </a:solidFill>
@@ -1609,7 +1617,7 @@
         <p:txBody>
           <a:bodyPr lIns="0" rIns="0" tIns="0" bIns="0"/>
           <a:p>
-            <a:endParaRPr b="0" lang="zh-CN" sz="2800" spc="-1" strike="noStrike">
+            <a:endParaRPr b="0" lang="en-US" sz="3200" spc="-1" strike="noStrike">
               <a:solidFill>
                 <a:srgbClr val="000000"/>
               </a:solidFill>
@@ -1645,7 +1653,7 @@
         <p:txBody>
           <a:bodyPr lIns="0" rIns="0" tIns="0" bIns="0"/>
           <a:p>
-            <a:endParaRPr b="0" lang="zh-CN" sz="2800" spc="-1" strike="noStrike">
+            <a:endParaRPr b="0" lang="en-US" sz="3200" spc="-1" strike="noStrike">
               <a:solidFill>
                 <a:srgbClr val="000000"/>
               </a:solidFill>
@@ -1681,7 +1689,7 @@
         <p:txBody>
           <a:bodyPr lIns="0" rIns="0" tIns="0" bIns="0"/>
           <a:p>
-            <a:endParaRPr b="0" lang="zh-CN" sz="2800" spc="-1" strike="noStrike">
+            <a:endParaRPr b="0" lang="en-US" sz="3200" spc="-1" strike="noStrike">
               <a:solidFill>
                 <a:srgbClr val="000000"/>
               </a:solidFill>
@@ -1739,7 +1747,8 @@
         <p:txBody>
           <a:bodyPr lIns="0" rIns="0" tIns="0" bIns="0" anchor="ctr"/>
           <a:p>
-            <a:endParaRPr b="0" lang="zh-CN" sz="1800" spc="-1" strike="noStrike">
+            <a:pPr algn="ctr"/>
+            <a:endParaRPr b="0" lang="en-US" sz="4400" spc="-1" strike="noStrike">
               <a:solidFill>
                 <a:srgbClr val="000000"/>
               </a:solidFill>
@@ -1834,7 +1843,8 @@
         <p:txBody>
           <a:bodyPr lIns="0" rIns="0" tIns="0" bIns="0" anchor="ctr"/>
           <a:p>
-            <a:endParaRPr b="0" lang="zh-CN" sz="1800" spc="-1" strike="noStrike">
+            <a:pPr algn="ctr"/>
+            <a:endParaRPr b="0" lang="en-US" sz="4400" spc="-1" strike="noStrike">
               <a:solidFill>
                 <a:srgbClr val="000000"/>
               </a:solidFill>
@@ -1870,7 +1880,7 @@
         <p:txBody>
           <a:bodyPr lIns="0" rIns="0" tIns="0" bIns="0"/>
           <a:p>
-            <a:endParaRPr b="0" lang="zh-CN" sz="2800" spc="-1" strike="noStrike">
+            <a:endParaRPr b="0" lang="en-US" sz="3200" spc="-1" strike="noStrike">
               <a:solidFill>
                 <a:srgbClr val="000000"/>
               </a:solidFill>
@@ -1906,7 +1916,7 @@
         <p:txBody>
           <a:bodyPr lIns="0" rIns="0" tIns="0" bIns="0"/>
           <a:p>
-            <a:endParaRPr b="0" lang="zh-CN" sz="2800" spc="-1" strike="noStrike">
+            <a:endParaRPr b="0" lang="en-US" sz="3200" spc="-1" strike="noStrike">
               <a:solidFill>
                 <a:srgbClr val="000000"/>
               </a:solidFill>
@@ -1942,7 +1952,7 @@
         <p:txBody>
           <a:bodyPr lIns="0" rIns="0" tIns="0" bIns="0"/>
           <a:p>
-            <a:endParaRPr b="0" lang="zh-CN" sz="2800" spc="-1" strike="noStrike">
+            <a:endParaRPr b="0" lang="en-US" sz="3200" spc="-1" strike="noStrike">
               <a:solidFill>
                 <a:srgbClr val="000000"/>
               </a:solidFill>
@@ -2000,7 +2010,8 @@
         <p:txBody>
           <a:bodyPr lIns="0" rIns="0" tIns="0" bIns="0" anchor="ctr"/>
           <a:p>
-            <a:endParaRPr b="0" lang="zh-CN" sz="1800" spc="-1" strike="noStrike">
+            <a:pPr algn="ctr"/>
+            <a:endParaRPr b="0" lang="en-US" sz="4400" spc="-1" strike="noStrike">
               <a:solidFill>
                 <a:srgbClr val="000000"/>
               </a:solidFill>
@@ -2036,7 +2047,7 @@
         <p:txBody>
           <a:bodyPr lIns="0" rIns="0" tIns="0" bIns="0"/>
           <a:p>
-            <a:endParaRPr b="0" lang="zh-CN" sz="2800" spc="-1" strike="noStrike">
+            <a:endParaRPr b="0" lang="en-US" sz="3200" spc="-1" strike="noStrike">
               <a:solidFill>
                 <a:srgbClr val="000000"/>
               </a:solidFill>
@@ -2072,7 +2083,7 @@
         <p:txBody>
           <a:bodyPr lIns="0" rIns="0" tIns="0" bIns="0"/>
           <a:p>
-            <a:endParaRPr b="0" lang="zh-CN" sz="2800" spc="-1" strike="noStrike">
+            <a:endParaRPr b="0" lang="en-US" sz="3200" spc="-1" strike="noStrike">
               <a:solidFill>
                 <a:srgbClr val="000000"/>
               </a:solidFill>
@@ -2108,7 +2119,7 @@
         <p:txBody>
           <a:bodyPr lIns="0" rIns="0" tIns="0" bIns="0"/>
           <a:p>
-            <a:endParaRPr b="0" lang="zh-CN" sz="2800" spc="-1" strike="noStrike">
+            <a:endParaRPr b="0" lang="en-US" sz="3200" spc="-1" strike="noStrike">
               <a:solidFill>
                 <a:srgbClr val="000000"/>
               </a:solidFill>
@@ -2166,7 +2177,8 @@
         <p:txBody>
           <a:bodyPr lIns="0" rIns="0" tIns="0" bIns="0" anchor="ctr"/>
           <a:p>
-            <a:endParaRPr b="0" lang="zh-CN" sz="1800" spc="-1" strike="noStrike">
+            <a:pPr algn="ctr"/>
+            <a:endParaRPr b="0" lang="en-US" sz="4400" spc="-1" strike="noStrike">
               <a:solidFill>
                 <a:srgbClr val="000000"/>
               </a:solidFill>
@@ -2202,7 +2214,7 @@
         <p:txBody>
           <a:bodyPr lIns="0" rIns="0" tIns="0" bIns="0"/>
           <a:p>
-            <a:endParaRPr b="0" lang="zh-CN" sz="2800" spc="-1" strike="noStrike">
+            <a:endParaRPr b="0" lang="en-US" sz="3200" spc="-1" strike="noStrike">
               <a:solidFill>
                 <a:srgbClr val="000000"/>
               </a:solidFill>
@@ -2238,7 +2250,7 @@
         <p:txBody>
           <a:bodyPr lIns="0" rIns="0" tIns="0" bIns="0"/>
           <a:p>
-            <a:endParaRPr b="0" lang="zh-CN" sz="2800" spc="-1" strike="noStrike">
+            <a:endParaRPr b="0" lang="en-US" sz="3200" spc="-1" strike="noStrike">
               <a:solidFill>
                 <a:srgbClr val="000000"/>
               </a:solidFill>
@@ -2296,7 +2308,8 @@
         <p:txBody>
           <a:bodyPr lIns="0" rIns="0" tIns="0" bIns="0" anchor="ctr"/>
           <a:p>
-            <a:endParaRPr b="0" lang="zh-CN" sz="1800" spc="-1" strike="noStrike">
+            <a:pPr algn="ctr"/>
+            <a:endParaRPr b="0" lang="en-US" sz="4400" spc="-1" strike="noStrike">
               <a:solidFill>
                 <a:srgbClr val="000000"/>
               </a:solidFill>
@@ -2332,7 +2345,7 @@
         <p:txBody>
           <a:bodyPr lIns="0" rIns="0" tIns="0" bIns="0"/>
           <a:p>
-            <a:endParaRPr b="0" lang="zh-CN" sz="2800" spc="-1" strike="noStrike">
+            <a:endParaRPr b="0" lang="en-US" sz="3200" spc="-1" strike="noStrike">
               <a:solidFill>
                 <a:srgbClr val="000000"/>
               </a:solidFill>
@@ -2368,7 +2381,7 @@
         <p:txBody>
           <a:bodyPr lIns="0" rIns="0" tIns="0" bIns="0"/>
           <a:p>
-            <a:endParaRPr b="0" lang="zh-CN" sz="2800" spc="-1" strike="noStrike">
+            <a:endParaRPr b="0" lang="en-US" sz="3200" spc="-1" strike="noStrike">
               <a:solidFill>
                 <a:srgbClr val="000000"/>
               </a:solidFill>
@@ -2404,7 +2417,7 @@
         <p:txBody>
           <a:bodyPr lIns="0" rIns="0" tIns="0" bIns="0"/>
           <a:p>
-            <a:endParaRPr b="0" lang="zh-CN" sz="2800" spc="-1" strike="noStrike">
+            <a:endParaRPr b="0" lang="en-US" sz="3200" spc="-1" strike="noStrike">
               <a:solidFill>
                 <a:srgbClr val="000000"/>
               </a:solidFill>
@@ -2440,7 +2453,7 @@
         <p:txBody>
           <a:bodyPr lIns="0" rIns="0" tIns="0" bIns="0"/>
           <a:p>
-            <a:endParaRPr b="0" lang="zh-CN" sz="2800" spc="-1" strike="noStrike">
+            <a:endParaRPr b="0" lang="en-US" sz="3200" spc="-1" strike="noStrike">
               <a:solidFill>
                 <a:srgbClr val="000000"/>
               </a:solidFill>
@@ -2498,7 +2511,8 @@
         <p:txBody>
           <a:bodyPr lIns="0" rIns="0" tIns="0" bIns="0" anchor="ctr"/>
           <a:p>
-            <a:endParaRPr b="0" lang="zh-CN" sz="1800" spc="-1" strike="noStrike">
+            <a:pPr algn="ctr"/>
+            <a:endParaRPr b="0" lang="en-US" sz="4400" spc="-1" strike="noStrike">
               <a:solidFill>
                 <a:srgbClr val="000000"/>
               </a:solidFill>
@@ -2534,7 +2548,7 @@
         <p:txBody>
           <a:bodyPr lIns="0" rIns="0" tIns="0" bIns="0"/>
           <a:p>
-            <a:endParaRPr b="0" lang="zh-CN" sz="2800" spc="-1" strike="noStrike">
+            <a:endParaRPr b="0" lang="en-US" sz="3200" spc="-1" strike="noStrike">
               <a:solidFill>
                 <a:srgbClr val="000000"/>
               </a:solidFill>
@@ -2570,7 +2584,7 @@
         <p:txBody>
           <a:bodyPr lIns="0" rIns="0" tIns="0" bIns="0"/>
           <a:p>
-            <a:endParaRPr b="0" lang="zh-CN" sz="2800" spc="-1" strike="noStrike">
+            <a:endParaRPr b="0" lang="en-US" sz="3200" spc="-1" strike="noStrike">
               <a:solidFill>
                 <a:srgbClr val="000000"/>
               </a:solidFill>
@@ -2696,7 +2710,8 @@
         <p:txBody>
           <a:bodyPr lIns="0" rIns="0" tIns="0" bIns="0" anchor="ctr"/>
           <a:p>
-            <a:endParaRPr b="0" lang="zh-CN" sz="1800" spc="-1" strike="noStrike">
+            <a:pPr algn="ctr"/>
+            <a:endParaRPr b="0" lang="en-US" sz="4400" spc="-1" strike="noStrike">
               <a:solidFill>
                 <a:srgbClr val="000000"/>
               </a:solidFill>
@@ -2791,7 +2806,8 @@
         <p:txBody>
           <a:bodyPr lIns="0" rIns="0" tIns="0" bIns="0" anchor="ctr"/>
           <a:p>
-            <a:endParaRPr b="0" lang="zh-CN" sz="1800" spc="-1" strike="noStrike">
+            <a:pPr algn="ctr"/>
+            <a:endParaRPr b="0" lang="en-US" sz="4400" spc="-1" strike="noStrike">
               <a:solidFill>
                 <a:srgbClr val="000000"/>
               </a:solidFill>
@@ -2827,7 +2843,7 @@
         <p:txBody>
           <a:bodyPr lIns="0" rIns="0" tIns="0" bIns="0"/>
           <a:p>
-            <a:endParaRPr b="0" lang="zh-CN" sz="2800" spc="-1" strike="noStrike">
+            <a:endParaRPr b="0" lang="en-US" sz="3200" spc="-1" strike="noStrike">
               <a:solidFill>
                 <a:srgbClr val="000000"/>
               </a:solidFill>
@@ -2885,7 +2901,8 @@
         <p:txBody>
           <a:bodyPr lIns="0" rIns="0" tIns="0" bIns="0" anchor="ctr"/>
           <a:p>
-            <a:endParaRPr b="0" lang="zh-CN" sz="1800" spc="-1" strike="noStrike">
+            <a:pPr algn="ctr"/>
+            <a:endParaRPr b="0" lang="en-US" sz="4400" spc="-1" strike="noStrike">
               <a:solidFill>
                 <a:srgbClr val="000000"/>
               </a:solidFill>
@@ -2921,7 +2938,7 @@
         <p:txBody>
           <a:bodyPr lIns="0" rIns="0" tIns="0" bIns="0"/>
           <a:p>
-            <a:endParaRPr b="0" lang="zh-CN" sz="2800" spc="-1" strike="noStrike">
+            <a:endParaRPr b="0" lang="en-US" sz="3200" spc="-1" strike="noStrike">
               <a:solidFill>
                 <a:srgbClr val="000000"/>
               </a:solidFill>
@@ -2957,7 +2974,7 @@
         <p:txBody>
           <a:bodyPr lIns="0" rIns="0" tIns="0" bIns="0"/>
           <a:p>
-            <a:endParaRPr b="0" lang="zh-CN" sz="2800" spc="-1" strike="noStrike">
+            <a:endParaRPr b="0" lang="en-US" sz="3200" spc="-1" strike="noStrike">
               <a:solidFill>
                 <a:srgbClr val="000000"/>
               </a:solidFill>
@@ -3015,7 +3032,8 @@
         <p:txBody>
           <a:bodyPr lIns="0" rIns="0" tIns="0" bIns="0" anchor="ctr"/>
           <a:p>
-            <a:endParaRPr b="0" lang="zh-CN" sz="1800" spc="-1" strike="noStrike">
+            <a:pPr algn="ctr"/>
+            <a:endParaRPr b="0" lang="en-US" sz="4400" spc="-1" strike="noStrike">
               <a:solidFill>
                 <a:srgbClr val="000000"/>
               </a:solidFill>
@@ -3073,7 +3091,8 @@
         <p:txBody>
           <a:bodyPr lIns="0" rIns="0" tIns="0" bIns="0" anchor="ctr"/>
           <a:p>
-            <a:endParaRPr b="0" lang="zh-CN" sz="1800" spc="-1" strike="noStrike">
+            <a:pPr algn="ctr"/>
+            <a:endParaRPr b="0" lang="en-US" sz="4400" spc="-1" strike="noStrike">
               <a:solidFill>
                 <a:srgbClr val="000000"/>
               </a:solidFill>
@@ -3109,7 +3128,7 @@
         <p:txBody>
           <a:bodyPr lIns="0" rIns="0" tIns="0" bIns="0"/>
           <a:p>
-            <a:endParaRPr b="0" lang="zh-CN" sz="2800" spc="-1" strike="noStrike">
+            <a:endParaRPr b="0" lang="en-US" sz="3200" spc="-1" strike="noStrike">
               <a:solidFill>
                 <a:srgbClr val="000000"/>
               </a:solidFill>
@@ -3226,7 +3245,8 @@
         <p:txBody>
           <a:bodyPr lIns="0" rIns="0" tIns="0" bIns="0" anchor="ctr"/>
           <a:p>
-            <a:endParaRPr b="0" lang="zh-CN" sz="1800" spc="-1" strike="noStrike">
+            <a:pPr algn="ctr"/>
+            <a:endParaRPr b="0" lang="en-US" sz="4400" spc="-1" strike="noStrike">
               <a:solidFill>
                 <a:srgbClr val="000000"/>
               </a:solidFill>
@@ -3262,7 +3282,7 @@
         <p:txBody>
           <a:bodyPr lIns="0" rIns="0" tIns="0" bIns="0"/>
           <a:p>
-            <a:endParaRPr b="0" lang="zh-CN" sz="2800" spc="-1" strike="noStrike">
+            <a:endParaRPr b="0" lang="en-US" sz="3200" spc="-1" strike="noStrike">
               <a:solidFill>
                 <a:srgbClr val="000000"/>
               </a:solidFill>
@@ -3298,7 +3318,7 @@
         <p:txBody>
           <a:bodyPr lIns="0" rIns="0" tIns="0" bIns="0"/>
           <a:p>
-            <a:endParaRPr b="0" lang="zh-CN" sz="2800" spc="-1" strike="noStrike">
+            <a:endParaRPr b="0" lang="en-US" sz="3200" spc="-1" strike="noStrike">
               <a:solidFill>
                 <a:srgbClr val="000000"/>
               </a:solidFill>
@@ -3334,7 +3354,7 @@
         <p:txBody>
           <a:bodyPr lIns="0" rIns="0" tIns="0" bIns="0"/>
           <a:p>
-            <a:endParaRPr b="0" lang="zh-CN" sz="2800" spc="-1" strike="noStrike">
+            <a:endParaRPr b="0" lang="en-US" sz="3200" spc="-1" strike="noStrike">
               <a:solidFill>
                 <a:srgbClr val="000000"/>
               </a:solidFill>
@@ -3392,7 +3412,8 @@
         <p:txBody>
           <a:bodyPr lIns="0" rIns="0" tIns="0" bIns="0" anchor="ctr"/>
           <a:p>
-            <a:endParaRPr b="0" lang="zh-CN" sz="1800" spc="-1" strike="noStrike">
+            <a:pPr algn="ctr"/>
+            <a:endParaRPr b="0" lang="en-US" sz="4400" spc="-1" strike="noStrike">
               <a:solidFill>
                 <a:srgbClr val="000000"/>
               </a:solidFill>
@@ -3428,7 +3449,7 @@
         <p:txBody>
           <a:bodyPr lIns="0" rIns="0" tIns="0" bIns="0"/>
           <a:p>
-            <a:endParaRPr b="0" lang="zh-CN" sz="2800" spc="-1" strike="noStrike">
+            <a:endParaRPr b="0" lang="en-US" sz="3200" spc="-1" strike="noStrike">
               <a:solidFill>
                 <a:srgbClr val="000000"/>
               </a:solidFill>
@@ -3464,7 +3485,7 @@
         <p:txBody>
           <a:bodyPr lIns="0" rIns="0" tIns="0" bIns="0"/>
           <a:p>
-            <a:endParaRPr b="0" lang="zh-CN" sz="2800" spc="-1" strike="noStrike">
+            <a:endParaRPr b="0" lang="en-US" sz="3200" spc="-1" strike="noStrike">
               <a:solidFill>
                 <a:srgbClr val="000000"/>
               </a:solidFill>
@@ -3500,7 +3521,7 @@
         <p:txBody>
           <a:bodyPr lIns="0" rIns="0" tIns="0" bIns="0"/>
           <a:p>
-            <a:endParaRPr b="0" lang="zh-CN" sz="2800" spc="-1" strike="noStrike">
+            <a:endParaRPr b="0" lang="en-US" sz="3200" spc="-1" strike="noStrike">
               <a:solidFill>
                 <a:srgbClr val="000000"/>
               </a:solidFill>
@@ -3558,7 +3579,8 @@
         <p:txBody>
           <a:bodyPr lIns="0" rIns="0" tIns="0" bIns="0" anchor="ctr"/>
           <a:p>
-            <a:endParaRPr b="0" lang="zh-CN" sz="1800" spc="-1" strike="noStrike">
+            <a:pPr algn="ctr"/>
+            <a:endParaRPr b="0" lang="en-US" sz="4400" spc="-1" strike="noStrike">
               <a:solidFill>
                 <a:srgbClr val="000000"/>
               </a:solidFill>
@@ -3594,7 +3616,7 @@
         <p:txBody>
           <a:bodyPr lIns="0" rIns="0" tIns="0" bIns="0"/>
           <a:p>
-            <a:endParaRPr b="0" lang="zh-CN" sz="2800" spc="-1" strike="noStrike">
+            <a:endParaRPr b="0" lang="en-US" sz="3200" spc="-1" strike="noStrike">
               <a:solidFill>
                 <a:srgbClr val="000000"/>
               </a:solidFill>
@@ -3630,7 +3652,7 @@
         <p:txBody>
           <a:bodyPr lIns="0" rIns="0" tIns="0" bIns="0"/>
           <a:p>
-            <a:endParaRPr b="0" lang="zh-CN" sz="2800" spc="-1" strike="noStrike">
+            <a:endParaRPr b="0" lang="en-US" sz="3200" spc="-1" strike="noStrike">
               <a:solidFill>
                 <a:srgbClr val="000000"/>
               </a:solidFill>
@@ -3666,7 +3688,7 @@
         <p:txBody>
           <a:bodyPr lIns="0" rIns="0" tIns="0" bIns="0"/>
           <a:p>
-            <a:endParaRPr b="0" lang="zh-CN" sz="2800" spc="-1" strike="noStrike">
+            <a:endParaRPr b="0" lang="en-US" sz="3200" spc="-1" strike="noStrike">
               <a:solidFill>
                 <a:srgbClr val="000000"/>
               </a:solidFill>
@@ -3724,7 +3746,8 @@
         <p:txBody>
           <a:bodyPr lIns="0" rIns="0" tIns="0" bIns="0" anchor="ctr"/>
           <a:p>
-            <a:endParaRPr b="0" lang="zh-CN" sz="1800" spc="-1" strike="noStrike">
+            <a:pPr algn="ctr"/>
+            <a:endParaRPr b="0" lang="en-US" sz="4400" spc="-1" strike="noStrike">
               <a:solidFill>
                 <a:srgbClr val="000000"/>
               </a:solidFill>
@@ -3760,7 +3783,7 @@
         <p:txBody>
           <a:bodyPr lIns="0" rIns="0" tIns="0" bIns="0"/>
           <a:p>
-            <a:endParaRPr b="0" lang="zh-CN" sz="2800" spc="-1" strike="noStrike">
+            <a:endParaRPr b="0" lang="en-US" sz="3200" spc="-1" strike="noStrike">
               <a:solidFill>
                 <a:srgbClr val="000000"/>
               </a:solidFill>
@@ -3796,7 +3819,7 @@
         <p:txBody>
           <a:bodyPr lIns="0" rIns="0" tIns="0" bIns="0"/>
           <a:p>
-            <a:endParaRPr b="0" lang="zh-CN" sz="2800" spc="-1" strike="noStrike">
+            <a:endParaRPr b="0" lang="en-US" sz="3200" spc="-1" strike="noStrike">
               <a:solidFill>
                 <a:srgbClr val="000000"/>
               </a:solidFill>
@@ -3854,7 +3877,8 @@
         <p:txBody>
           <a:bodyPr lIns="0" rIns="0" tIns="0" bIns="0" anchor="ctr"/>
           <a:p>
-            <a:endParaRPr b="0" lang="zh-CN" sz="1800" spc="-1" strike="noStrike">
+            <a:pPr algn="ctr"/>
+            <a:endParaRPr b="0" lang="en-US" sz="4400" spc="-1" strike="noStrike">
               <a:solidFill>
                 <a:srgbClr val="000000"/>
               </a:solidFill>
@@ -3890,7 +3914,7 @@
         <p:txBody>
           <a:bodyPr lIns="0" rIns="0" tIns="0" bIns="0"/>
           <a:p>
-            <a:endParaRPr b="0" lang="zh-CN" sz="2800" spc="-1" strike="noStrike">
+            <a:endParaRPr b="0" lang="en-US" sz="3200" spc="-1" strike="noStrike">
               <a:solidFill>
                 <a:srgbClr val="000000"/>
               </a:solidFill>
@@ -3926,7 +3950,7 @@
         <p:txBody>
           <a:bodyPr lIns="0" rIns="0" tIns="0" bIns="0"/>
           <a:p>
-            <a:endParaRPr b="0" lang="zh-CN" sz="2800" spc="-1" strike="noStrike">
+            <a:endParaRPr b="0" lang="en-US" sz="3200" spc="-1" strike="noStrike">
               <a:solidFill>
                 <a:srgbClr val="000000"/>
               </a:solidFill>
@@ -3962,7 +3986,7 @@
         <p:txBody>
           <a:bodyPr lIns="0" rIns="0" tIns="0" bIns="0"/>
           <a:p>
-            <a:endParaRPr b="0" lang="zh-CN" sz="2800" spc="-1" strike="noStrike">
+            <a:endParaRPr b="0" lang="en-US" sz="3200" spc="-1" strike="noStrike">
               <a:solidFill>
                 <a:srgbClr val="000000"/>
               </a:solidFill>
@@ -3998,7 +4022,7 @@
         <p:txBody>
           <a:bodyPr lIns="0" rIns="0" tIns="0" bIns="0"/>
           <a:p>
-            <a:endParaRPr b="0" lang="zh-CN" sz="2800" spc="-1" strike="noStrike">
+            <a:endParaRPr b="0" lang="en-US" sz="3200" spc="-1" strike="noStrike">
               <a:solidFill>
                 <a:srgbClr val="000000"/>
               </a:solidFill>
@@ -4056,7 +4080,8 @@
         <p:txBody>
           <a:bodyPr lIns="0" rIns="0" tIns="0" bIns="0" anchor="ctr"/>
           <a:p>
-            <a:endParaRPr b="0" lang="zh-CN" sz="1800" spc="-1" strike="noStrike">
+            <a:pPr algn="ctr"/>
+            <a:endParaRPr b="0" lang="en-US" sz="4400" spc="-1" strike="noStrike">
               <a:solidFill>
                 <a:srgbClr val="000000"/>
               </a:solidFill>
@@ -4092,7 +4117,7 @@
         <p:txBody>
           <a:bodyPr lIns="0" rIns="0" tIns="0" bIns="0"/>
           <a:p>
-            <a:endParaRPr b="0" lang="zh-CN" sz="2800" spc="-1" strike="noStrike">
+            <a:endParaRPr b="0" lang="en-US" sz="3200" spc="-1" strike="noStrike">
               <a:solidFill>
                 <a:srgbClr val="000000"/>
               </a:solidFill>
@@ -4128,7 +4153,7 @@
         <p:txBody>
           <a:bodyPr lIns="0" rIns="0" tIns="0" bIns="0"/>
           <a:p>
-            <a:endParaRPr b="0" lang="zh-CN" sz="2800" spc="-1" strike="noStrike">
+            <a:endParaRPr b="0" lang="en-US" sz="3200" spc="-1" strike="noStrike">
               <a:solidFill>
                 <a:srgbClr val="000000"/>
               </a:solidFill>
@@ -4232,7 +4257,8 @@
         <p:txBody>
           <a:bodyPr lIns="0" rIns="0" tIns="0" bIns="0" anchor="ctr"/>
           <a:p>
-            <a:endParaRPr b="0" lang="zh-CN" sz="1800" spc="-1" strike="noStrike">
+            <a:pPr algn="ctr"/>
+            <a:endParaRPr b="0" lang="en-US" sz="4400" spc="-1" strike="noStrike">
               <a:solidFill>
                 <a:srgbClr val="000000"/>
               </a:solidFill>
@@ -4268,7 +4294,7 @@
         <p:txBody>
           <a:bodyPr lIns="0" rIns="0" tIns="0" bIns="0"/>
           <a:p>
-            <a:endParaRPr b="0" lang="zh-CN" sz="2800" spc="-1" strike="noStrike">
+            <a:endParaRPr b="0" lang="en-US" sz="3200" spc="-1" strike="noStrike">
               <a:solidFill>
                 <a:srgbClr val="000000"/>
               </a:solidFill>
@@ -4304,7 +4330,7 @@
         <p:txBody>
           <a:bodyPr lIns="0" rIns="0" tIns="0" bIns="0"/>
           <a:p>
-            <a:endParaRPr b="0" lang="zh-CN" sz="2800" spc="-1" strike="noStrike">
+            <a:endParaRPr b="0" lang="en-US" sz="3200" spc="-1" strike="noStrike">
               <a:solidFill>
                 <a:srgbClr val="000000"/>
               </a:solidFill>
@@ -4362,7 +4388,8 @@
         <p:txBody>
           <a:bodyPr lIns="0" rIns="0" tIns="0" bIns="0" anchor="ctr"/>
           <a:p>
-            <a:endParaRPr b="0" lang="zh-CN" sz="1800" spc="-1" strike="noStrike">
+            <a:pPr algn="ctr"/>
+            <a:endParaRPr b="0" lang="en-US" sz="4400" spc="-1" strike="noStrike">
               <a:solidFill>
                 <a:srgbClr val="000000"/>
               </a:solidFill>
@@ -4479,7 +4506,8 @@
         <p:txBody>
           <a:bodyPr lIns="0" rIns="0" tIns="0" bIns="0" anchor="ctr"/>
           <a:p>
-            <a:endParaRPr b="0" lang="zh-CN" sz="1800" spc="-1" strike="noStrike">
+            <a:pPr algn="ctr"/>
+            <a:endParaRPr b="0" lang="en-US" sz="4400" spc="-1" strike="noStrike">
               <a:solidFill>
                 <a:srgbClr val="000000"/>
               </a:solidFill>
@@ -4515,7 +4543,7 @@
         <p:txBody>
           <a:bodyPr lIns="0" rIns="0" tIns="0" bIns="0"/>
           <a:p>
-            <a:endParaRPr b="0" lang="zh-CN" sz="2800" spc="-1" strike="noStrike">
+            <a:endParaRPr b="0" lang="en-US" sz="3200" spc="-1" strike="noStrike">
               <a:solidFill>
                 <a:srgbClr val="000000"/>
               </a:solidFill>
@@ -4551,7 +4579,7 @@
         <p:txBody>
           <a:bodyPr lIns="0" rIns="0" tIns="0" bIns="0"/>
           <a:p>
-            <a:endParaRPr b="0" lang="zh-CN" sz="2800" spc="-1" strike="noStrike">
+            <a:endParaRPr b="0" lang="en-US" sz="3200" spc="-1" strike="noStrike">
               <a:solidFill>
                 <a:srgbClr val="000000"/>
               </a:solidFill>
@@ -4587,7 +4615,7 @@
         <p:txBody>
           <a:bodyPr lIns="0" rIns="0" tIns="0" bIns="0"/>
           <a:p>
-            <a:endParaRPr b="0" lang="zh-CN" sz="2800" spc="-1" strike="noStrike">
+            <a:endParaRPr b="0" lang="en-US" sz="3200" spc="-1" strike="noStrike">
               <a:solidFill>
                 <a:srgbClr val="000000"/>
               </a:solidFill>
@@ -4645,7 +4673,8 @@
         <p:txBody>
           <a:bodyPr lIns="0" rIns="0" tIns="0" bIns="0" anchor="ctr"/>
           <a:p>
-            <a:endParaRPr b="0" lang="zh-CN" sz="1800" spc="-1" strike="noStrike">
+            <a:pPr algn="ctr"/>
+            <a:endParaRPr b="0" lang="en-US" sz="4400" spc="-1" strike="noStrike">
               <a:solidFill>
                 <a:srgbClr val="000000"/>
               </a:solidFill>
@@ -4681,7 +4710,7 @@
         <p:txBody>
           <a:bodyPr lIns="0" rIns="0" tIns="0" bIns="0"/>
           <a:p>
-            <a:endParaRPr b="0" lang="zh-CN" sz="2800" spc="-1" strike="noStrike">
+            <a:endParaRPr b="0" lang="en-US" sz="3200" spc="-1" strike="noStrike">
               <a:solidFill>
                 <a:srgbClr val="000000"/>
               </a:solidFill>
@@ -4717,7 +4746,7 @@
         <p:txBody>
           <a:bodyPr lIns="0" rIns="0" tIns="0" bIns="0"/>
           <a:p>
-            <a:endParaRPr b="0" lang="zh-CN" sz="2800" spc="-1" strike="noStrike">
+            <a:endParaRPr b="0" lang="en-US" sz="3200" spc="-1" strike="noStrike">
               <a:solidFill>
                 <a:srgbClr val="000000"/>
               </a:solidFill>
@@ -4753,7 +4782,7 @@
         <p:txBody>
           <a:bodyPr lIns="0" rIns="0" tIns="0" bIns="0"/>
           <a:p>
-            <a:endParaRPr b="0" lang="zh-CN" sz="2800" spc="-1" strike="noStrike">
+            <a:endParaRPr b="0" lang="en-US" sz="3200" spc="-1" strike="noStrike">
               <a:solidFill>
                 <a:srgbClr val="000000"/>
               </a:solidFill>
@@ -4811,7 +4840,8 @@
         <p:txBody>
           <a:bodyPr lIns="0" rIns="0" tIns="0" bIns="0" anchor="ctr"/>
           <a:p>
-            <a:endParaRPr b="0" lang="zh-CN" sz="1800" spc="-1" strike="noStrike">
+            <a:pPr algn="ctr"/>
+            <a:endParaRPr b="0" lang="en-US" sz="4400" spc="-1" strike="noStrike">
               <a:solidFill>
                 <a:srgbClr val="000000"/>
               </a:solidFill>
@@ -4847,7 +4877,7 @@
         <p:txBody>
           <a:bodyPr lIns="0" rIns="0" tIns="0" bIns="0"/>
           <a:p>
-            <a:endParaRPr b="0" lang="zh-CN" sz="2800" spc="-1" strike="noStrike">
+            <a:endParaRPr b="0" lang="en-US" sz="3200" spc="-1" strike="noStrike">
               <a:solidFill>
                 <a:srgbClr val="000000"/>
               </a:solidFill>
@@ -4883,7 +4913,7 @@
         <p:txBody>
           <a:bodyPr lIns="0" rIns="0" tIns="0" bIns="0"/>
           <a:p>
-            <a:endParaRPr b="0" lang="zh-CN" sz="2800" spc="-1" strike="noStrike">
+            <a:endParaRPr b="0" lang="en-US" sz="3200" spc="-1" strike="noStrike">
               <a:solidFill>
                 <a:srgbClr val="000000"/>
               </a:solidFill>
@@ -4919,7 +4949,7 @@
         <p:txBody>
           <a:bodyPr lIns="0" rIns="0" tIns="0" bIns="0"/>
           <a:p>
-            <a:endParaRPr b="0" lang="zh-CN" sz="2800" spc="-1" strike="noStrike">
+            <a:endParaRPr b="0" lang="en-US" sz="3200" spc="-1" strike="noStrike">
               <a:solidFill>
                 <a:srgbClr val="000000"/>
               </a:solidFill>
@@ -4975,7 +5005,7 @@
         <p:spPr>
           <a:xfrm>
             <a:off x="457200" y="205200"/>
-            <a:ext cx="8228880" cy="858240"/>
+            <a:ext cx="8229240" cy="858600"/>
           </a:xfrm>
           <a:prstGeom prst="rect">
             <a:avLst/>
@@ -4984,7 +5014,22 @@
         <p:txBody>
           <a:bodyPr lIns="0" rIns="0" tIns="0" bIns="0" anchor="ctr"/>
           <a:p>
-            <a:endParaRPr b="0" lang="zh-CN" sz="1800" spc="-1" strike="noStrike">
+            <a:pPr algn="ctr"/>
+            <a:r>
+              <a:rPr b="0" lang="en-US" sz="4400" spc="-1" strike="noStrike">
+                <a:solidFill>
+                  <a:srgbClr val="000000"/>
+                </a:solidFill>
+                <a:uFill>
+                  <a:solidFill>
+                    <a:srgbClr val="ffffff"/>
+                  </a:solidFill>
+                </a:uFill>
+                <a:latin typeface="Arial"/>
+              </a:rPr>
+              <a:t>Click to edit the title text format</a:t>
+            </a:r>
+            <a:endParaRPr b="0" lang="en-US" sz="4400" spc="-1" strike="noStrike">
               <a:solidFill>
                 <a:srgbClr val="000000"/>
               </a:solidFill>
@@ -5011,7 +5056,7 @@
         <p:spPr>
           <a:xfrm>
             <a:off x="457200" y="1203480"/>
-            <a:ext cx="8228880" cy="2982600"/>
+            <a:ext cx="8229240" cy="2982960"/>
           </a:xfrm>
           <a:prstGeom prst="rect">
             <a:avLst/>
@@ -5029,7 +5074,7 @@
               <a:buChar char=""/>
             </a:pPr>
             <a:r>
-              <a:rPr b="0" lang="zh-CN" sz="2800" spc="-1" strike="noStrike">
+              <a:rPr b="0" lang="en-US" sz="3200" spc="-1" strike="noStrike">
                 <a:solidFill>
                   <a:srgbClr val="000000"/>
                 </a:solidFill>
@@ -5042,7 +5087,7 @@
               </a:rPr>
               <a:t>Click to edit the outline text format</a:t>
             </a:r>
-            <a:endParaRPr b="0" lang="zh-CN" sz="2800" spc="-1" strike="noStrike">
+            <a:endParaRPr b="0" lang="en-US" sz="3200" spc="-1" strike="noStrike">
               <a:solidFill>
                 <a:srgbClr val="000000"/>
               </a:solidFill>
@@ -5064,7 +5109,7 @@
               <a:buChar char=""/>
             </a:pPr>
             <a:r>
-              <a:rPr b="0" lang="zh-CN" sz="2800" spc="-1" strike="noStrike">
+              <a:rPr b="0" lang="en-US" sz="2800" spc="-1" strike="noStrike">
                 <a:solidFill>
                   <a:srgbClr val="000000"/>
                 </a:solidFill>
@@ -5077,7 +5122,7 @@
               </a:rPr>
               <a:t>Second Outline Level</a:t>
             </a:r>
-            <a:endParaRPr b="0" lang="zh-CN" sz="2800" spc="-1" strike="noStrike">
+            <a:endParaRPr b="0" lang="en-US" sz="2800" spc="-1" strike="noStrike">
               <a:solidFill>
                 <a:srgbClr val="000000"/>
               </a:solidFill>
@@ -5099,7 +5144,7 @@
               <a:buChar char=""/>
             </a:pPr>
             <a:r>
-              <a:rPr b="0" lang="zh-CN" sz="2800" spc="-1" strike="noStrike">
+              <a:rPr b="0" lang="en-US" sz="2400" spc="-1" strike="noStrike">
                 <a:solidFill>
                   <a:srgbClr val="000000"/>
                 </a:solidFill>
@@ -5112,7 +5157,7 @@
               </a:rPr>
               <a:t>Third Outline Level</a:t>
             </a:r>
-            <a:endParaRPr b="0" lang="zh-CN" sz="2800" spc="-1" strike="noStrike">
+            <a:endParaRPr b="0" lang="en-US" sz="2400" spc="-1" strike="noStrike">
               <a:solidFill>
                 <a:srgbClr val="000000"/>
               </a:solidFill>
@@ -5134,7 +5179,7 @@
               <a:buChar char=""/>
             </a:pPr>
             <a:r>
-              <a:rPr b="0" lang="zh-CN" sz="2800" spc="-1" strike="noStrike">
+              <a:rPr b="0" lang="en-US" sz="2000" spc="-1" strike="noStrike">
                 <a:solidFill>
                   <a:srgbClr val="000000"/>
                 </a:solidFill>
@@ -5147,7 +5192,7 @@
               </a:rPr>
               <a:t>Fourth Outline Level</a:t>
             </a:r>
-            <a:endParaRPr b="0" lang="zh-CN" sz="2800" spc="-1" strike="noStrike">
+            <a:endParaRPr b="0" lang="en-US" sz="2000" spc="-1" strike="noStrike">
               <a:solidFill>
                 <a:srgbClr val="000000"/>
               </a:solidFill>
@@ -5169,7 +5214,7 @@
               <a:buChar char=""/>
             </a:pPr>
             <a:r>
-              <a:rPr b="0" lang="zh-CN" sz="2800" spc="-1" strike="noStrike">
+              <a:rPr b="0" lang="en-US" sz="2000" spc="-1" strike="noStrike">
                 <a:solidFill>
                   <a:srgbClr val="000000"/>
                 </a:solidFill>
@@ -5182,7 +5227,7 @@
               </a:rPr>
               <a:t>Fifth Outline Level</a:t>
             </a:r>
-            <a:endParaRPr b="0" lang="zh-CN" sz="2800" spc="-1" strike="noStrike">
+            <a:endParaRPr b="0" lang="en-US" sz="2000" spc="-1" strike="noStrike">
               <a:solidFill>
                 <a:srgbClr val="000000"/>
               </a:solidFill>
@@ -5204,7 +5249,7 @@
               <a:buChar char=""/>
             </a:pPr>
             <a:r>
-              <a:rPr b="0" lang="zh-CN" sz="2800" spc="-1" strike="noStrike">
+              <a:rPr b="0" lang="en-US" sz="2000" spc="-1" strike="noStrike">
                 <a:solidFill>
                   <a:srgbClr val="000000"/>
                 </a:solidFill>
@@ -5217,7 +5262,7 @@
               </a:rPr>
               <a:t>Sixth Outline Level</a:t>
             </a:r>
-            <a:endParaRPr b="0" lang="zh-CN" sz="2800" spc="-1" strike="noStrike">
+            <a:endParaRPr b="0" lang="en-US" sz="2000" spc="-1" strike="noStrike">
               <a:solidFill>
                 <a:srgbClr val="000000"/>
               </a:solidFill>
@@ -5239,7 +5284,7 @@
               <a:buChar char=""/>
             </a:pPr>
             <a:r>
-              <a:rPr b="0" lang="zh-CN" sz="2800" spc="-1" strike="noStrike">
+              <a:rPr b="0" lang="en-US" sz="2000" spc="-1" strike="noStrike">
                 <a:solidFill>
                   <a:srgbClr val="000000"/>
                 </a:solidFill>
@@ -5252,7 +5297,7 @@
               </a:rPr>
               <a:t>Seventh Outline Level</a:t>
             </a:r>
-            <a:endParaRPr b="0" lang="zh-CN" sz="2800" spc="-1" strike="noStrike">
+            <a:endParaRPr b="0" lang="en-US" sz="2000" spc="-1" strike="noStrike">
               <a:solidFill>
                 <a:srgbClr val="000000"/>
               </a:solidFill>
@@ -5332,8 +5377,9 @@
         <p:txBody>
           <a:bodyPr lIns="0" rIns="0" tIns="0" bIns="0" anchor="ctr"/>
           <a:p>
-            <a:r>
-              <a:rPr b="0" lang="zh-CN" sz="1800" spc="-1" strike="noStrike">
+            <a:pPr algn="ctr"/>
+            <a:r>
+              <a:rPr b="0" lang="en-US" sz="4400" spc="-1" strike="noStrike">
                 <a:solidFill>
                   <a:srgbClr val="000000"/>
                 </a:solidFill>
@@ -5346,7 +5392,7 @@
               </a:rPr>
               <a:t>Click to edit the title text format</a:t>
             </a:r>
-            <a:endParaRPr b="0" lang="zh-CN" sz="1800" spc="-1" strike="noStrike">
+            <a:endParaRPr b="0" lang="en-US" sz="4400" spc="-1" strike="noStrike">
               <a:solidFill>
                 <a:srgbClr val="000000"/>
               </a:solidFill>
@@ -5391,7 +5437,7 @@
               <a:buChar char=""/>
             </a:pPr>
             <a:r>
-              <a:rPr b="0" lang="zh-CN" sz="2800" spc="-1" strike="noStrike">
+              <a:rPr b="0" lang="en-US" sz="3200" spc="-1" strike="noStrike">
                 <a:solidFill>
                   <a:srgbClr val="000000"/>
                 </a:solidFill>
@@ -5404,7 +5450,7 @@
               </a:rPr>
               <a:t>Click to edit the outline text format</a:t>
             </a:r>
-            <a:endParaRPr b="0" lang="zh-CN" sz="2800" spc="-1" strike="noStrike">
+            <a:endParaRPr b="0" lang="en-US" sz="3200" spc="-1" strike="noStrike">
               <a:solidFill>
                 <a:srgbClr val="000000"/>
               </a:solidFill>
@@ -5426,7 +5472,7 @@
               <a:buChar char=""/>
             </a:pPr>
             <a:r>
-              <a:rPr b="0" lang="zh-CN" sz="2000" spc="-1" strike="noStrike">
+              <a:rPr b="0" lang="en-US" sz="2800" spc="-1" strike="noStrike">
                 <a:solidFill>
                   <a:srgbClr val="000000"/>
                 </a:solidFill>
@@ -5439,7 +5485,7 @@
               </a:rPr>
               <a:t>Second Outline Level</a:t>
             </a:r>
-            <a:endParaRPr b="0" lang="zh-CN" sz="2000" spc="-1" strike="noStrike">
+            <a:endParaRPr b="0" lang="en-US" sz="2800" spc="-1" strike="noStrike">
               <a:solidFill>
                 <a:srgbClr val="000000"/>
               </a:solidFill>
@@ -5461,7 +5507,7 @@
               <a:buChar char=""/>
             </a:pPr>
             <a:r>
-              <a:rPr b="0" lang="zh-CN" sz="1800" spc="-1" strike="noStrike">
+              <a:rPr b="0" lang="en-US" sz="2400" spc="-1" strike="noStrike">
                 <a:solidFill>
                   <a:srgbClr val="000000"/>
                 </a:solidFill>
@@ -5474,7 +5520,7 @@
               </a:rPr>
               <a:t>Third Outline Level</a:t>
             </a:r>
-            <a:endParaRPr b="0" lang="zh-CN" sz="1800" spc="-1" strike="noStrike">
+            <a:endParaRPr b="0" lang="en-US" sz="2400" spc="-1" strike="noStrike">
               <a:solidFill>
                 <a:srgbClr val="000000"/>
               </a:solidFill>
@@ -5496,7 +5542,7 @@
               <a:buChar char=""/>
             </a:pPr>
             <a:r>
-              <a:rPr b="0" lang="zh-CN" sz="1800" spc="-1" strike="noStrike">
+              <a:rPr b="0" lang="en-US" sz="2000" spc="-1" strike="noStrike">
                 <a:solidFill>
                   <a:srgbClr val="000000"/>
                 </a:solidFill>
@@ -5509,7 +5555,7 @@
               </a:rPr>
               <a:t>Fourth Outline Level</a:t>
             </a:r>
-            <a:endParaRPr b="0" lang="zh-CN" sz="1800" spc="-1" strike="noStrike">
+            <a:endParaRPr b="0" lang="en-US" sz="2000" spc="-1" strike="noStrike">
               <a:solidFill>
                 <a:srgbClr val="000000"/>
               </a:solidFill>
@@ -5531,7 +5577,7 @@
               <a:buChar char=""/>
             </a:pPr>
             <a:r>
-              <a:rPr b="0" lang="zh-CN" sz="2000" spc="-1" strike="noStrike">
+              <a:rPr b="0" lang="en-US" sz="2000" spc="-1" strike="noStrike">
                 <a:solidFill>
                   <a:srgbClr val="000000"/>
                 </a:solidFill>
@@ -5544,7 +5590,7 @@
               </a:rPr>
               <a:t>Fifth Outline Level</a:t>
             </a:r>
-            <a:endParaRPr b="0" lang="zh-CN" sz="2000" spc="-1" strike="noStrike">
+            <a:endParaRPr b="0" lang="en-US" sz="2000" spc="-1" strike="noStrike">
               <a:solidFill>
                 <a:srgbClr val="000000"/>
               </a:solidFill>
@@ -5566,7 +5612,7 @@
               <a:buChar char=""/>
             </a:pPr>
             <a:r>
-              <a:rPr b="0" lang="zh-CN" sz="2000" spc="-1" strike="noStrike">
+              <a:rPr b="0" lang="en-US" sz="2000" spc="-1" strike="noStrike">
                 <a:solidFill>
                   <a:srgbClr val="000000"/>
                 </a:solidFill>
@@ -5579,7 +5625,7 @@
               </a:rPr>
               <a:t>Sixth Outline Level</a:t>
             </a:r>
-            <a:endParaRPr b="0" lang="zh-CN" sz="2000" spc="-1" strike="noStrike">
+            <a:endParaRPr b="0" lang="en-US" sz="2000" spc="-1" strike="noStrike">
               <a:solidFill>
                 <a:srgbClr val="000000"/>
               </a:solidFill>
@@ -5601,7 +5647,7 @@
               <a:buChar char=""/>
             </a:pPr>
             <a:r>
-              <a:rPr b="0" lang="zh-CN" sz="2000" spc="-1" strike="noStrike">
+              <a:rPr b="0" lang="en-US" sz="2000" spc="-1" strike="noStrike">
                 <a:solidFill>
                   <a:srgbClr val="000000"/>
                 </a:solidFill>
@@ -5614,7 +5660,7 @@
               </a:rPr>
               <a:t>Seventh Outline Level</a:t>
             </a:r>
-            <a:endParaRPr b="0" lang="zh-CN" sz="2000" spc="-1" strike="noStrike">
+            <a:endParaRPr b="0" lang="en-US" sz="2000" spc="-1" strike="noStrike">
               <a:solidFill>
                 <a:srgbClr val="000000"/>
               </a:solidFill>
@@ -5694,8 +5740,9 @@
         <p:txBody>
           <a:bodyPr lIns="0" rIns="0" tIns="0" bIns="0" anchor="ctr"/>
           <a:p>
-            <a:r>
-              <a:rPr b="0" lang="zh-CN" sz="1800" spc="-1" strike="noStrike">
+            <a:pPr algn="ctr"/>
+            <a:r>
+              <a:rPr b="0" lang="en-US" sz="4400" spc="-1" strike="noStrike">
                 <a:solidFill>
                   <a:srgbClr val="000000"/>
                 </a:solidFill>
@@ -5708,7 +5755,7 @@
               </a:rPr>
               <a:t>Click to edit the title text format</a:t>
             </a:r>
-            <a:endParaRPr b="0" lang="zh-CN" sz="1800" spc="-1" strike="noStrike">
+            <a:endParaRPr b="0" lang="en-US" sz="4400" spc="-1" strike="noStrike">
               <a:solidFill>
                 <a:srgbClr val="000000"/>
               </a:solidFill>
@@ -5753,7 +5800,7 @@
               <a:buChar char=""/>
             </a:pPr>
             <a:r>
-              <a:rPr b="0" lang="zh-CN" sz="2800" spc="-1" strike="noStrike">
+              <a:rPr b="0" lang="en-US" sz="3200" spc="-1" strike="noStrike">
                 <a:solidFill>
                   <a:srgbClr val="000000"/>
                 </a:solidFill>
@@ -5766,7 +5813,7 @@
               </a:rPr>
               <a:t>Click to edit the outline text format</a:t>
             </a:r>
-            <a:endParaRPr b="0" lang="zh-CN" sz="2800" spc="-1" strike="noStrike">
+            <a:endParaRPr b="0" lang="en-US" sz="3200" spc="-1" strike="noStrike">
               <a:solidFill>
                 <a:srgbClr val="000000"/>
               </a:solidFill>
@@ -5788,7 +5835,7 @@
               <a:buChar char=""/>
             </a:pPr>
             <a:r>
-              <a:rPr b="0" lang="zh-CN" sz="2000" spc="-1" strike="noStrike">
+              <a:rPr b="0" lang="en-US" sz="2800" spc="-1" strike="noStrike">
                 <a:solidFill>
                   <a:srgbClr val="000000"/>
                 </a:solidFill>
@@ -5801,7 +5848,7 @@
               </a:rPr>
               <a:t>Second Outline Level</a:t>
             </a:r>
-            <a:endParaRPr b="0" lang="zh-CN" sz="2000" spc="-1" strike="noStrike">
+            <a:endParaRPr b="0" lang="en-US" sz="2800" spc="-1" strike="noStrike">
               <a:solidFill>
                 <a:srgbClr val="000000"/>
               </a:solidFill>
@@ -5823,7 +5870,7 @@
               <a:buChar char=""/>
             </a:pPr>
             <a:r>
-              <a:rPr b="0" lang="zh-CN" sz="1800" spc="-1" strike="noStrike">
+              <a:rPr b="0" lang="en-US" sz="2400" spc="-1" strike="noStrike">
                 <a:solidFill>
                   <a:srgbClr val="000000"/>
                 </a:solidFill>
@@ -5836,7 +5883,7 @@
               </a:rPr>
               <a:t>Third Outline Level</a:t>
             </a:r>
-            <a:endParaRPr b="0" lang="zh-CN" sz="1800" spc="-1" strike="noStrike">
+            <a:endParaRPr b="0" lang="en-US" sz="2400" spc="-1" strike="noStrike">
               <a:solidFill>
                 <a:srgbClr val="000000"/>
               </a:solidFill>
@@ -5858,7 +5905,7 @@
               <a:buChar char=""/>
             </a:pPr>
             <a:r>
-              <a:rPr b="0" lang="zh-CN" sz="1800" spc="-1" strike="noStrike">
+              <a:rPr b="0" lang="en-US" sz="2000" spc="-1" strike="noStrike">
                 <a:solidFill>
                   <a:srgbClr val="000000"/>
                 </a:solidFill>
@@ -5871,7 +5918,7 @@
               </a:rPr>
               <a:t>Fourth Outline Level</a:t>
             </a:r>
-            <a:endParaRPr b="0" lang="zh-CN" sz="1800" spc="-1" strike="noStrike">
+            <a:endParaRPr b="0" lang="en-US" sz="2000" spc="-1" strike="noStrike">
               <a:solidFill>
                 <a:srgbClr val="000000"/>
               </a:solidFill>
@@ -5893,7 +5940,7 @@
               <a:buChar char=""/>
             </a:pPr>
             <a:r>
-              <a:rPr b="0" lang="zh-CN" sz="2000" spc="-1" strike="noStrike">
+              <a:rPr b="0" lang="en-US" sz="2000" spc="-1" strike="noStrike">
                 <a:solidFill>
                   <a:srgbClr val="000000"/>
                 </a:solidFill>
@@ -5906,7 +5953,7 @@
               </a:rPr>
               <a:t>Fifth Outline Level</a:t>
             </a:r>
-            <a:endParaRPr b="0" lang="zh-CN" sz="2000" spc="-1" strike="noStrike">
+            <a:endParaRPr b="0" lang="en-US" sz="2000" spc="-1" strike="noStrike">
               <a:solidFill>
                 <a:srgbClr val="000000"/>
               </a:solidFill>
@@ -5928,7 +5975,7 @@
               <a:buChar char=""/>
             </a:pPr>
             <a:r>
-              <a:rPr b="0" lang="zh-CN" sz="2000" spc="-1" strike="noStrike">
+              <a:rPr b="0" lang="en-US" sz="2000" spc="-1" strike="noStrike">
                 <a:solidFill>
                   <a:srgbClr val="000000"/>
                 </a:solidFill>
@@ -5941,7 +5988,7 @@
               </a:rPr>
               <a:t>Sixth Outline Level</a:t>
             </a:r>
-            <a:endParaRPr b="0" lang="zh-CN" sz="2000" spc="-1" strike="noStrike">
+            <a:endParaRPr b="0" lang="en-US" sz="2000" spc="-1" strike="noStrike">
               <a:solidFill>
                 <a:srgbClr val="000000"/>
               </a:solidFill>
@@ -5963,7 +6010,7 @@
               <a:buChar char=""/>
             </a:pPr>
             <a:r>
-              <a:rPr b="0" lang="zh-CN" sz="2000" spc="-1" strike="noStrike">
+              <a:rPr b="0" lang="en-US" sz="2000" spc="-1" strike="noStrike">
                 <a:solidFill>
                   <a:srgbClr val="000000"/>
                 </a:solidFill>
@@ -5976,7 +6023,7 @@
               </a:rPr>
               <a:t>Seventh Outline Level</a:t>
             </a:r>
-            <a:endParaRPr b="0" lang="zh-CN" sz="2000" spc="-1" strike="noStrike">
+            <a:endParaRPr b="0" lang="en-US" sz="2000" spc="-1" strike="noStrike">
               <a:solidFill>
                 <a:srgbClr val="000000"/>
               </a:solidFill>
@@ -6036,7 +6083,7 @@
         <p:spPr>
           <a:xfrm>
             <a:off x="1060920" y="1501200"/>
-            <a:ext cx="5447880" cy="577080"/>
+            <a:ext cx="5447520" cy="576720"/>
           </a:xfrm>
           <a:prstGeom prst="rect">
             <a:avLst/>
@@ -6113,7 +6160,7 @@
         <p:spPr>
           <a:xfrm>
             <a:off x="2350080" y="3408480"/>
-            <a:ext cx="716400" cy="302760"/>
+            <a:ext cx="716040" cy="302400"/>
           </a:xfrm>
           <a:prstGeom prst="rect">
             <a:avLst/>
@@ -6139,7 +6186,7 @@
         <p:spPr>
           <a:xfrm>
             <a:off x="1149120" y="3204000"/>
-            <a:ext cx="2325960" cy="1366560"/>
+            <a:ext cx="2325600" cy="1366200"/>
           </a:xfrm>
           <a:prstGeom prst="rect">
             <a:avLst/>
@@ -6489,7 +6536,7 @@
         <p:spPr>
           <a:xfrm>
             <a:off x="4190760" y="2492640"/>
-            <a:ext cx="2666520" cy="1895760"/>
+            <a:ext cx="2666160" cy="1895400"/>
           </a:xfrm>
           <a:prstGeom prst="rect">
             <a:avLst/>
@@ -6519,7 +6566,7 @@
         <p:spPr>
           <a:xfrm>
             <a:off x="5115600" y="457200"/>
-            <a:ext cx="3312720" cy="3291120"/>
+            <a:ext cx="3312360" cy="3290760"/>
           </a:xfrm>
           <a:prstGeom prst="rect">
             <a:avLst/>
@@ -6538,7 +6585,7 @@
         <p:spPr>
           <a:xfrm>
             <a:off x="1188720" y="2194560"/>
-            <a:ext cx="4388760" cy="360"/>
+            <a:ext cx="4388400" cy="360"/>
           </a:xfrm>
           <a:custGeom>
             <a:avLst/>
@@ -6582,7 +6629,7 @@
         <p:spPr>
           <a:xfrm>
             <a:off x="7955280" y="2194560"/>
-            <a:ext cx="1188360" cy="360"/>
+            <a:ext cx="1188000" cy="360"/>
           </a:xfrm>
           <a:custGeom>
             <a:avLst/>
@@ -6668,7 +6715,7 @@
       </p:grpSpPr>
       <p:sp>
         <p:nvSpPr>
-          <p:cNvPr id="154" name="Line 1"/>
+          <p:cNvPr id="155" name="Line 1"/>
           <p:cNvSpPr/>
           <p:nvPr/>
         </p:nvSpPr>
@@ -6696,7 +6743,7 @@
       </p:sp>
       <p:sp>
         <p:nvSpPr>
-          <p:cNvPr id="155" name="Line 2"/>
+          <p:cNvPr id="156" name="Line 2"/>
           <p:cNvSpPr/>
           <p:nvPr/>
         </p:nvSpPr>
@@ -6724,14 +6771,14 @@
       </p:sp>
       <p:sp>
         <p:nvSpPr>
-          <p:cNvPr id="156" name="CustomShape 3"/>
+          <p:cNvPr id="157" name="CustomShape 3"/>
           <p:cNvSpPr/>
           <p:nvPr/>
         </p:nvSpPr>
         <p:spPr>
           <a:xfrm>
             <a:off x="342000" y="174240"/>
-            <a:ext cx="4435560" cy="975600"/>
+            <a:ext cx="4435200" cy="975240"/>
           </a:xfrm>
           <a:prstGeom prst="rect">
             <a:avLst/>
@@ -6801,7 +6848,7 @@
       </p:sp>
       <p:pic>
         <p:nvPicPr>
-          <p:cNvPr id="157" name="图片 142" descr=""/>
+          <p:cNvPr id="158" name="图片 142" descr=""/>
           <p:cNvPicPr/>
           <p:nvPr/>
         </p:nvPicPr>
@@ -6812,7 +6859,7 @@
         <p:spPr>
           <a:xfrm>
             <a:off x="7132680" y="174240"/>
-            <a:ext cx="1855080" cy="730800"/>
+            <a:ext cx="1854720" cy="730440"/>
           </a:xfrm>
           <a:prstGeom prst="rect">
             <a:avLst/>
@@ -6824,14 +6871,14 @@
       </p:pic>
       <p:sp>
         <p:nvSpPr>
-          <p:cNvPr id="158" name="TextShape 4"/>
-          <p:cNvSpPr txBox="1"/>
+          <p:cNvPr id="159" name="CustomShape 4"/>
+          <p:cNvSpPr/>
           <p:nvPr/>
         </p:nvSpPr>
         <p:spPr>
           <a:xfrm>
             <a:off x="2854080" y="2720520"/>
-            <a:ext cx="3446640" cy="925560"/>
+            <a:ext cx="3446280" cy="925200"/>
           </a:xfrm>
           <a:prstGeom prst="rect">
             <a:avLst/>
@@ -6841,6 +6888,12 @@
             <a:noFill/>
           </a:ln>
         </p:spPr>
+        <p:style>
+          <a:lnRef idx="0"/>
+          <a:fillRef idx="0"/>
+          <a:effectRef idx="0"/>
+          <a:fontRef idx="minor"/>
+        </p:style>
         <p:txBody>
           <a:bodyPr lIns="90000" rIns="90000" tIns="45000" bIns="45000"/>
           <a:p>
@@ -7124,14 +7177,14 @@
       </p:grpSpPr>
       <p:sp>
         <p:nvSpPr>
-          <p:cNvPr id="159" name="CustomShape 1"/>
+          <p:cNvPr id="160" name="CustomShape 1"/>
           <p:cNvSpPr/>
           <p:nvPr/>
         </p:nvSpPr>
         <p:spPr>
           <a:xfrm>
             <a:off x="623880" y="637920"/>
-            <a:ext cx="7885800" cy="2138760"/>
+            <a:ext cx="7885440" cy="2138400"/>
           </a:xfrm>
           <a:prstGeom prst="rect">
             <a:avLst/>
@@ -7216,14 +7269,14 @@
       </p:sp>
       <p:sp>
         <p:nvSpPr>
-          <p:cNvPr id="160" name="CustomShape 2"/>
+          <p:cNvPr id="161" name="CustomShape 2"/>
           <p:cNvSpPr/>
           <p:nvPr/>
         </p:nvSpPr>
         <p:spPr>
           <a:xfrm>
             <a:off x="623880" y="2772360"/>
-            <a:ext cx="7885800" cy="56880"/>
+            <a:ext cx="7885440" cy="56520"/>
           </a:xfrm>
           <a:prstGeom prst="rect">
             <a:avLst/>
@@ -7293,7 +7346,7 @@
       </p:grpSpPr>
       <p:sp>
         <p:nvSpPr>
-          <p:cNvPr id="161" name="Line 1"/>
+          <p:cNvPr id="162" name="Line 1"/>
           <p:cNvSpPr/>
           <p:nvPr/>
         </p:nvSpPr>
@@ -7321,7 +7374,7 @@
       </p:sp>
       <p:sp>
         <p:nvSpPr>
-          <p:cNvPr id="162" name="Line 2"/>
+          <p:cNvPr id="163" name="Line 2"/>
           <p:cNvSpPr/>
           <p:nvPr/>
         </p:nvSpPr>
@@ -7349,14 +7402,14 @@
       </p:sp>
       <p:sp>
         <p:nvSpPr>
-          <p:cNvPr id="163" name="CustomShape 3"/>
+          <p:cNvPr id="164" name="CustomShape 3"/>
           <p:cNvSpPr/>
           <p:nvPr/>
         </p:nvSpPr>
         <p:spPr>
           <a:xfrm>
             <a:off x="342000" y="174240"/>
-            <a:ext cx="8228520" cy="975600"/>
+            <a:ext cx="8228160" cy="975240"/>
           </a:xfrm>
           <a:prstGeom prst="rect">
             <a:avLst/>
@@ -7426,14 +7479,14 @@
       </p:sp>
       <p:sp>
         <p:nvSpPr>
-          <p:cNvPr id="164" name="CustomShape 4"/>
+          <p:cNvPr id="165" name="CustomShape 4"/>
           <p:cNvSpPr/>
           <p:nvPr/>
         </p:nvSpPr>
         <p:spPr>
           <a:xfrm>
             <a:off x="202320" y="1357560"/>
-            <a:ext cx="8228520" cy="3784680"/>
+            <a:ext cx="8228160" cy="3784320"/>
           </a:xfrm>
           <a:prstGeom prst="rect">
             <a:avLst/>
@@ -7452,7 +7505,7 @@
         <p:txBody>
           <a:bodyPr lIns="90000" rIns="90000" tIns="45000" bIns="45000"/>
           <a:p>
-            <a:pPr marL="514440" indent="-513360">
+            <a:pPr marL="514440" indent="-513000">
               <a:lnSpc>
                 <a:spcPct val="125000"/>
               </a:lnSpc>
@@ -7493,7 +7546,7 @@
       </p:sp>
       <p:pic>
         <p:nvPicPr>
-          <p:cNvPr id="165" name="图片 149" descr=""/>
+          <p:cNvPr id="166" name="图片 149" descr=""/>
           <p:cNvPicPr/>
           <p:nvPr/>
         </p:nvPicPr>
@@ -7504,7 +7557,7 @@
         <p:spPr>
           <a:xfrm>
             <a:off x="7132680" y="174240"/>
-            <a:ext cx="1855080" cy="730800"/>
+            <a:ext cx="1854720" cy="730440"/>
           </a:xfrm>
           <a:prstGeom prst="rect">
             <a:avLst/>
@@ -7565,14 +7618,14 @@
       </p:grpSpPr>
       <p:sp>
         <p:nvSpPr>
-          <p:cNvPr id="166" name="CustomShape 1"/>
+          <p:cNvPr id="167" name="CustomShape 1"/>
           <p:cNvSpPr/>
           <p:nvPr/>
         </p:nvSpPr>
         <p:spPr>
           <a:xfrm>
             <a:off x="623880" y="637920"/>
-            <a:ext cx="7885800" cy="2138760"/>
+            <a:ext cx="7885440" cy="2138400"/>
           </a:xfrm>
           <a:prstGeom prst="rect">
             <a:avLst/>
@@ -7702,14 +7755,14 @@
       </p:sp>
       <p:sp>
         <p:nvSpPr>
-          <p:cNvPr id="167" name="CustomShape 2"/>
+          <p:cNvPr id="168" name="CustomShape 2"/>
           <p:cNvSpPr/>
           <p:nvPr/>
         </p:nvSpPr>
         <p:spPr>
           <a:xfrm>
             <a:off x="623880" y="2772360"/>
-            <a:ext cx="7885800" cy="56880"/>
+            <a:ext cx="7885440" cy="56520"/>
           </a:xfrm>
           <a:prstGeom prst="rect">
             <a:avLst/>
@@ -7779,14 +7832,14 @@
       </p:grpSpPr>
       <p:sp>
         <p:nvSpPr>
-          <p:cNvPr id="168" name="CustomShape 1"/>
+          <p:cNvPr id="169" name="CustomShape 1"/>
           <p:cNvSpPr/>
           <p:nvPr/>
         </p:nvSpPr>
         <p:spPr>
           <a:xfrm>
             <a:off x="2433240" y="731520"/>
-            <a:ext cx="4275720" cy="3442320"/>
+            <a:ext cx="4275360" cy="3441960"/>
           </a:xfrm>
           <a:prstGeom prst="rect">
             <a:avLst/>
@@ -7841,14 +7894,14 @@
       </p:sp>
       <p:sp>
         <p:nvSpPr>
-          <p:cNvPr id="169" name="CustomShape 2"/>
+          <p:cNvPr id="170" name="CustomShape 2"/>
           <p:cNvSpPr/>
           <p:nvPr/>
         </p:nvSpPr>
         <p:spPr>
           <a:xfrm>
             <a:off x="2433240" y="1873080"/>
-            <a:ext cx="4275720" cy="1308600"/>
+            <a:ext cx="4275360" cy="1308240"/>
           </a:xfrm>
           <a:prstGeom prst="rect">
             <a:avLst/>
@@ -7933,7 +7986,7 @@
       </p:sp>
       <p:sp>
         <p:nvSpPr>
-          <p:cNvPr id="170" name="Line 3"/>
+          <p:cNvPr id="171" name="Line 3"/>
           <p:cNvSpPr/>
           <p:nvPr/>
         </p:nvSpPr>
@@ -7961,7 +8014,7 @@
       </p:sp>
       <p:sp>
         <p:nvSpPr>
-          <p:cNvPr id="171" name="Line 4"/>
+          <p:cNvPr id="172" name="Line 4"/>
           <p:cNvSpPr/>
           <p:nvPr/>
         </p:nvSpPr>
@@ -7989,14 +8042,14 @@
       </p:sp>
       <p:sp>
         <p:nvSpPr>
-          <p:cNvPr id="172" name="CustomShape 5"/>
+          <p:cNvPr id="173" name="CustomShape 5"/>
           <p:cNvSpPr/>
           <p:nvPr/>
         </p:nvSpPr>
         <p:spPr>
           <a:xfrm>
             <a:off x="342000" y="174240"/>
-            <a:ext cx="8228520" cy="975600"/>
+            <a:ext cx="8228160" cy="975240"/>
           </a:xfrm>
           <a:prstGeom prst="rect">
             <a:avLst/>
@@ -8100,14 +8153,14 @@
       </p:grpSpPr>
       <p:sp>
         <p:nvSpPr>
-          <p:cNvPr id="173" name="CustomShape 1"/>
+          <p:cNvPr id="174" name="CustomShape 1"/>
           <p:cNvSpPr/>
           <p:nvPr/>
         </p:nvSpPr>
         <p:spPr>
           <a:xfrm>
             <a:off x="3031560" y="2038320"/>
-            <a:ext cx="3321360" cy="607320"/>
+            <a:ext cx="3321000" cy="606960"/>
           </a:xfrm>
           <a:prstGeom prst="rect">
             <a:avLst/>
@@ -8162,14 +8215,14 @@
       </p:sp>
       <p:sp>
         <p:nvSpPr>
-          <p:cNvPr id="174" name="CustomShape 2"/>
+          <p:cNvPr id="175" name="CustomShape 2"/>
           <p:cNvSpPr/>
           <p:nvPr/>
         </p:nvSpPr>
         <p:spPr>
           <a:xfrm>
             <a:off x="3108240" y="2615400"/>
-            <a:ext cx="3450960" cy="394560"/>
+            <a:ext cx="3450600" cy="394200"/>
           </a:xfrm>
           <a:prstGeom prst="rect">
             <a:avLst/>
@@ -8224,14 +8277,14 @@
       </p:sp>
       <p:sp>
         <p:nvSpPr>
-          <p:cNvPr id="175" name="CustomShape 3"/>
+          <p:cNvPr id="176" name="CustomShape 3"/>
           <p:cNvSpPr/>
           <p:nvPr/>
         </p:nvSpPr>
         <p:spPr>
           <a:xfrm rot="840000">
-            <a:off x="5421600" y="1953000"/>
-            <a:ext cx="1894320" cy="1308600"/>
+            <a:off x="5421600" y="1952640"/>
+            <a:ext cx="1893960" cy="1308240"/>
           </a:xfrm>
           <a:prstGeom prst="rect">
             <a:avLst/>
@@ -8398,7 +8451,7 @@
         <p:spPr>
           <a:xfrm>
             <a:off x="342000" y="174240"/>
-            <a:ext cx="8228520" cy="975600"/>
+            <a:ext cx="8228160" cy="975240"/>
           </a:xfrm>
           <a:prstGeom prst="rect">
             <a:avLst/>
@@ -8460,7 +8513,7 @@
         <p:spPr>
           <a:xfrm>
             <a:off x="342000" y="1228680"/>
-            <a:ext cx="8228520" cy="3784680"/>
+            <a:ext cx="8228160" cy="3784320"/>
           </a:xfrm>
           <a:prstGeom prst="rect">
             <a:avLst/>
@@ -8481,9 +8534,9 @@
         <p:txBody>
           <a:bodyPr lIns="90000" rIns="90000" tIns="45000" bIns="45000"/>
           <a:p>
-            <a:pPr marL="514440" indent="-513360">
+            <a:pPr marL="514440" indent="-513000">
               <a:lnSpc>
-                <a:spcPts val="1129"/>
+                <a:spcPts val="398"/>
               </a:lnSpc>
               <a:buClr>
                 <a:srgbClr val="6f1b1b"/>
@@ -8551,7 +8604,7 @@
           <a:p>
             <a:pPr>
               <a:lnSpc>
-                <a:spcPts val="1129"/>
+                <a:spcPts val="398"/>
               </a:lnSpc>
             </a:pPr>
             <a:r>
@@ -8674,7 +8727,7 @@
           <a:p>
             <a:pPr marL="720">
               <a:lnSpc>
-                <a:spcPts val="1129"/>
+                <a:spcPts val="398"/>
               </a:lnSpc>
             </a:pPr>
             <a:r>
@@ -8737,7 +8790,7 @@
           <a:p>
             <a:pPr marL="720">
               <a:lnSpc>
-                <a:spcPts val="1129"/>
+                <a:spcPts val="398"/>
               </a:lnSpc>
             </a:pPr>
             <a:r>
@@ -8873,9 +8926,9 @@
             </a:endParaRPr>
           </a:p>
           <a:p>
-            <a:pPr>
+            <a:pPr marL="720">
               <a:lnSpc>
-                <a:spcPts val="1129"/>
+                <a:spcPts val="398"/>
               </a:lnSpc>
             </a:pPr>
             <a:r>
@@ -8936,9 +8989,9 @@
             </a:endParaRPr>
           </a:p>
           <a:p>
-            <a:pPr>
+            <a:pPr marL="720">
               <a:lnSpc>
-                <a:spcPts val="1129"/>
+                <a:spcPts val="398"/>
               </a:lnSpc>
             </a:pPr>
             <a:r>
@@ -9074,9 +9127,9 @@
             </a:endParaRPr>
           </a:p>
           <a:p>
-            <a:pPr>
+            <a:pPr marL="720">
               <a:lnSpc>
-                <a:spcPts val="1129"/>
+                <a:spcPts val="398"/>
               </a:lnSpc>
             </a:pPr>
             <a:r>
@@ -9154,7 +9207,7 @@
           <a:p>
             <a:pPr marL="720">
               <a:lnSpc>
-                <a:spcPts val="1129"/>
+                <a:spcPts val="398"/>
               </a:lnSpc>
             </a:pPr>
             <a:r>
@@ -9275,9 +9328,9 @@
             </a:endParaRPr>
           </a:p>
           <a:p>
-            <a:pPr>
+            <a:pPr marL="720">
               <a:lnSpc>
-                <a:spcPts val="1129"/>
+                <a:spcPts val="398"/>
               </a:lnSpc>
             </a:pPr>
             <a:r>
@@ -9502,7 +9555,7 @@
         <p:spPr>
           <a:xfrm>
             <a:off x="7132320" y="174240"/>
-            <a:ext cx="1855080" cy="730800"/>
+            <a:ext cx="1854720" cy="730440"/>
           </a:xfrm>
           <a:prstGeom prst="rect">
             <a:avLst/>
@@ -9570,7 +9623,7 @@
         <p:spPr>
           <a:xfrm>
             <a:off x="623880" y="637920"/>
-            <a:ext cx="7885800" cy="2138760"/>
+            <a:ext cx="7885440" cy="2138400"/>
           </a:xfrm>
           <a:prstGeom prst="rect">
             <a:avLst/>
@@ -9677,7 +9730,7 @@
         <p:spPr>
           <a:xfrm>
             <a:off x="623880" y="2772360"/>
-            <a:ext cx="7885800" cy="56880"/>
+            <a:ext cx="7885440" cy="56520"/>
           </a:xfrm>
           <a:prstGeom prst="rect">
             <a:avLst/>
@@ -9810,7 +9863,7 @@
         <p:spPr>
           <a:xfrm>
             <a:off x="342000" y="174240"/>
-            <a:ext cx="8228520" cy="975600"/>
+            <a:ext cx="8228160" cy="975240"/>
           </a:xfrm>
           <a:prstGeom prst="rect">
             <a:avLst/>
@@ -9917,7 +9970,7 @@
         <p:spPr>
           <a:xfrm>
             <a:off x="202320" y="1357560"/>
-            <a:ext cx="8228520" cy="3784680"/>
+            <a:ext cx="8228160" cy="3784320"/>
           </a:xfrm>
           <a:prstGeom prst="rect">
             <a:avLst/>
@@ -9936,7 +9989,7 @@
         <p:txBody>
           <a:bodyPr lIns="90000" rIns="90000" tIns="45000" bIns="45000"/>
           <a:p>
-            <a:pPr marL="343080" indent="-342720">
+            <a:pPr marL="343080" indent="-342360">
               <a:lnSpc>
                 <a:spcPct val="150000"/>
               </a:lnSpc>
@@ -10187,7 +10240,7 @@
             </a:endParaRPr>
           </a:p>
           <a:p>
-            <a:pPr marL="343080" indent="-342720">
+            <a:pPr marL="343080" indent="-342360">
               <a:lnSpc>
                 <a:spcPct val="150000"/>
               </a:lnSpc>
@@ -10240,7 +10293,7 @@
             </a:endParaRPr>
           </a:p>
           <a:p>
-            <a:pPr marL="285840" indent="-285480">
+            <a:pPr marL="285840" indent="-285120">
               <a:lnSpc>
                 <a:spcPct val="150000"/>
               </a:lnSpc>
@@ -10338,7 +10391,7 @@
             </a:endParaRPr>
           </a:p>
           <a:p>
-            <a:pPr marL="285840" indent="-285480">
+            <a:pPr marL="285840" indent="-285120">
               <a:lnSpc>
                 <a:spcPct val="150000"/>
               </a:lnSpc>
@@ -10466,7 +10519,7 @@
             </a:endParaRPr>
           </a:p>
           <a:p>
-            <a:pPr marL="285840" indent="-285480">
+            <a:pPr marL="285840" indent="-285120">
               <a:lnSpc>
                 <a:spcPct val="150000"/>
               </a:lnSpc>
@@ -10564,7 +10617,7 @@
             </a:endParaRPr>
           </a:p>
           <a:p>
-            <a:pPr marL="285840" indent="-285480">
+            <a:pPr marL="285840" indent="-285120">
               <a:lnSpc>
                 <a:spcPct val="150000"/>
               </a:lnSpc>
@@ -10796,7 +10849,7 @@
         <p:spPr>
           <a:xfrm>
             <a:off x="7132680" y="174240"/>
-            <a:ext cx="1855080" cy="730800"/>
+            <a:ext cx="1854720" cy="730440"/>
           </a:xfrm>
           <a:prstGeom prst="rect">
             <a:avLst/>
@@ -10920,7 +10973,7 @@
         <p:spPr>
           <a:xfrm>
             <a:off x="342000" y="174240"/>
-            <a:ext cx="8228520" cy="975600"/>
+            <a:ext cx="8228160" cy="975240"/>
           </a:xfrm>
           <a:prstGeom prst="rect">
             <a:avLst/>
@@ -11027,7 +11080,7 @@
         <p:spPr>
           <a:xfrm>
             <a:off x="202320" y="1150200"/>
-            <a:ext cx="8443440" cy="3784680"/>
+            <a:ext cx="8443080" cy="3784320"/>
           </a:xfrm>
           <a:prstGeom prst="rect">
             <a:avLst/>
@@ -11046,7 +11099,7 @@
         <p:txBody>
           <a:bodyPr lIns="90000" rIns="90000" tIns="45000" bIns="45000"/>
           <a:p>
-            <a:pPr marL="343080" indent="-342720">
+            <a:pPr marL="343080" indent="-342360">
               <a:lnSpc>
                 <a:spcPct val="125000"/>
               </a:lnSpc>
@@ -11099,7 +11152,7 @@
             </a:endParaRPr>
           </a:p>
           <a:p>
-            <a:pPr marL="343080" indent="-342720">
+            <a:pPr marL="343080" indent="-342360">
               <a:lnSpc>
                 <a:spcPct val="150000"/>
               </a:lnSpc>
@@ -11137,7 +11190,7 @@
             </a:endParaRPr>
           </a:p>
           <a:p>
-            <a:pPr marL="285840" indent="-285480">
+            <a:pPr marL="285840" indent="-285120">
               <a:lnSpc>
                 <a:spcPct val="150000"/>
               </a:lnSpc>
@@ -11205,7 +11258,7 @@
             </a:endParaRPr>
           </a:p>
           <a:p>
-            <a:pPr marL="343080" indent="-342720">
+            <a:pPr marL="343080" indent="-342360">
               <a:lnSpc>
                 <a:spcPct val="150000"/>
               </a:lnSpc>
@@ -11243,7 +11296,7 @@
             </a:endParaRPr>
           </a:p>
           <a:p>
-            <a:pPr marL="285840" indent="-285480">
+            <a:pPr marL="285840" indent="-285120">
               <a:lnSpc>
                 <a:spcPct val="150000"/>
               </a:lnSpc>
@@ -11386,7 +11439,7 @@
             </a:endParaRPr>
           </a:p>
           <a:p>
-            <a:pPr marL="285840" indent="-285480">
+            <a:pPr marL="285840" indent="-285120">
               <a:lnSpc>
                 <a:spcPct val="150000"/>
               </a:lnSpc>
@@ -11544,7 +11597,7 @@
             </a:endParaRPr>
           </a:p>
           <a:p>
-            <a:pPr marL="285840" indent="-285480">
+            <a:pPr marL="285840" indent="-285120">
               <a:lnSpc>
                 <a:spcPct val="150000"/>
               </a:lnSpc>
@@ -11582,7 +11635,7 @@
             </a:endParaRPr>
           </a:p>
           <a:p>
-            <a:pPr marL="285840" indent="-285480">
+            <a:pPr marL="285840" indent="-285120">
               <a:lnSpc>
                 <a:spcPct val="150000"/>
               </a:lnSpc>
@@ -11755,7 +11808,7 @@
             </a:endParaRPr>
           </a:p>
           <a:p>
-            <a:pPr marL="285840" indent="-285480">
+            <a:pPr marL="285840" indent="-285120">
               <a:lnSpc>
                 <a:spcPct val="150000"/>
               </a:lnSpc>
@@ -11823,7 +11876,7 @@
             </a:endParaRPr>
           </a:p>
           <a:p>
-            <a:pPr marL="285840" indent="-285480">
+            <a:pPr marL="285840" indent="-285120">
               <a:lnSpc>
                 <a:spcPct val="150000"/>
               </a:lnSpc>
@@ -11995,7 +12048,7 @@
         <p:spPr>
           <a:xfrm>
             <a:off x="7132680" y="174240"/>
-            <a:ext cx="1855080" cy="730800"/>
+            <a:ext cx="1854720" cy="730440"/>
           </a:xfrm>
           <a:prstGeom prst="rect">
             <a:avLst/>
@@ -12119,7 +12172,7 @@
         <p:spPr>
           <a:xfrm>
             <a:off x="342000" y="174240"/>
-            <a:ext cx="8228520" cy="975600"/>
+            <a:ext cx="8228160" cy="975240"/>
           </a:xfrm>
           <a:prstGeom prst="rect">
             <a:avLst/>
@@ -12226,7 +12279,7 @@
         <p:spPr>
           <a:xfrm>
             <a:off x="202320" y="1150200"/>
-            <a:ext cx="8443440" cy="3784680"/>
+            <a:ext cx="8443080" cy="3784320"/>
           </a:xfrm>
           <a:prstGeom prst="rect">
             <a:avLst/>
@@ -12245,7 +12298,7 @@
         <p:txBody>
           <a:bodyPr lIns="90000" rIns="90000" tIns="45000" bIns="45000"/>
           <a:p>
-            <a:pPr marL="343080" indent="-342720">
+            <a:pPr marL="343080" indent="-342360">
               <a:lnSpc>
                 <a:spcPct val="125000"/>
               </a:lnSpc>
@@ -12298,7 +12351,7 @@
             </a:endParaRPr>
           </a:p>
           <a:p>
-            <a:pPr marL="343080" indent="-342720">
+            <a:pPr marL="343080" indent="-342360">
               <a:lnSpc>
                 <a:spcPct val="150000"/>
               </a:lnSpc>
@@ -12336,7 +12389,7 @@
             </a:endParaRPr>
           </a:p>
           <a:p>
-            <a:pPr marL="285840" indent="-285480">
+            <a:pPr marL="285840" indent="-285120">
               <a:lnSpc>
                 <a:spcPct val="150000"/>
               </a:lnSpc>
@@ -12479,7 +12532,7 @@
             </a:endParaRPr>
           </a:p>
           <a:p>
-            <a:pPr marL="285840" indent="-285480">
+            <a:pPr marL="285840" indent="-285120">
               <a:lnSpc>
                 <a:spcPct val="150000"/>
               </a:lnSpc>
@@ -12532,7 +12585,7 @@
             </a:endParaRPr>
           </a:p>
           <a:p>
-            <a:pPr marL="285840" indent="-285480">
+            <a:pPr marL="285840" indent="-285120">
               <a:lnSpc>
                 <a:spcPct val="150000"/>
               </a:lnSpc>
@@ -12674,7 +12727,7 @@
         <p:spPr>
           <a:xfrm>
             <a:off x="7132680" y="174240"/>
-            <a:ext cx="1855080" cy="730800"/>
+            <a:ext cx="1854720" cy="730440"/>
           </a:xfrm>
           <a:prstGeom prst="rect">
             <a:avLst/>
@@ -12742,7 +12795,7 @@
         <p:spPr>
           <a:xfrm>
             <a:off x="623880" y="637920"/>
-            <a:ext cx="7885800" cy="2138760"/>
+            <a:ext cx="7885440" cy="2138400"/>
           </a:xfrm>
           <a:prstGeom prst="rect">
             <a:avLst/>
@@ -12834,7 +12887,7 @@
         <p:spPr>
           <a:xfrm>
             <a:off x="623880" y="2772360"/>
-            <a:ext cx="7885800" cy="56880"/>
+            <a:ext cx="7885440" cy="56520"/>
           </a:xfrm>
           <a:prstGeom prst="rect">
             <a:avLst/>
@@ -12967,7 +13020,7 @@
         <p:spPr>
           <a:xfrm>
             <a:off x="342000" y="174240"/>
-            <a:ext cx="4435560" cy="975600"/>
+            <a:ext cx="4435200" cy="975240"/>
           </a:xfrm>
           <a:prstGeom prst="rect">
             <a:avLst/>
@@ -13048,7 +13101,7 @@
         <p:spPr>
           <a:xfrm>
             <a:off x="7132680" y="174240"/>
-            <a:ext cx="1855080" cy="730800"/>
+            <a:ext cx="1854720" cy="730440"/>
           </a:xfrm>
           <a:prstGeom prst="rect">
             <a:avLst/>
@@ -13071,7 +13124,7 @@
         <p:spPr>
           <a:xfrm>
             <a:off x="342000" y="1217160"/>
-            <a:ext cx="6752160" cy="3825720"/>
+            <a:ext cx="6751800" cy="3825360"/>
           </a:xfrm>
           <a:prstGeom prst="rect">
             <a:avLst/>
@@ -13081,6 +13134,140 @@
           </a:ln>
         </p:spPr>
       </p:pic>
+      <p:sp>
+        <p:nvSpPr>
+          <p:cNvPr id="149" name="TextShape 4"/>
+          <p:cNvSpPr txBox="1"/>
+          <p:nvPr/>
+        </p:nvSpPr>
+        <p:spPr>
+          <a:xfrm>
+            <a:off x="7093800" y="1737720"/>
+            <a:ext cx="1920240" cy="3474360"/>
+          </a:xfrm>
+          <a:prstGeom prst="rect">
+            <a:avLst/>
+          </a:prstGeom>
+          <a:noFill/>
+          <a:ln>
+            <a:noFill/>
+          </a:ln>
+        </p:spPr>
+        <p:txBody>
+          <a:bodyPr lIns="90000" rIns="90000" tIns="45000" bIns="45000"/>
+          <a:p>
+            <a:r>
+              <a:rPr b="0" lang="en-US" sz="1800" spc="-1" strike="noStrike">
+                <a:solidFill>
+                  <a:srgbClr val="000000"/>
+                </a:solidFill>
+                <a:uFill>
+                  <a:solidFill>
+                    <a:srgbClr val="ffffff"/>
+                  </a:solidFill>
+                </a:uFill>
+                <a:latin typeface="Arial"/>
+              </a:rPr>
+              <a:t>变量使用</a:t>
+            </a:r>
+            <a:r>
+              <a:rPr b="0" lang="en-US" sz="1800" spc="-1" strike="noStrike">
+                <a:solidFill>
+                  <a:srgbClr val="000000"/>
+                </a:solidFill>
+                <a:uFill>
+                  <a:solidFill>
+                    <a:srgbClr val="ffffff"/>
+                  </a:solidFill>
+                </a:uFill>
+                <a:latin typeface="Arial"/>
+              </a:rPr>
+              <a:t>${}</a:t>
+            </a:r>
+            <a:r>
+              <a:rPr b="0" lang="en-US" sz="1800" spc="-1" strike="noStrike">
+                <a:solidFill>
+                  <a:srgbClr val="000000"/>
+                </a:solidFill>
+                <a:uFill>
+                  <a:solidFill>
+                    <a:srgbClr val="ffffff"/>
+                  </a:solidFill>
+                </a:uFill>
+                <a:latin typeface="Arial"/>
+              </a:rPr>
+              <a:t>方式取值</a:t>
+            </a:r>
+            <a:r>
+              <a:rPr b="0" lang="en-US" sz="1800" spc="-1" strike="noStrike">
+                <a:solidFill>
+                  <a:srgbClr val="000000"/>
+                </a:solidFill>
+                <a:uFill>
+                  <a:solidFill>
+                    <a:srgbClr val="ffffff"/>
+                  </a:solidFill>
+                </a:uFill>
+                <a:latin typeface="Arial"/>
+              </a:rPr>
+              <a:t>,</a:t>
+            </a:r>
+            <a:r>
+              <a:rPr b="0" lang="en-US" sz="1800" spc="-1" strike="noStrike">
+                <a:solidFill>
+                  <a:srgbClr val="000000"/>
+                </a:solidFill>
+                <a:uFill>
+                  <a:solidFill>
+                    <a:srgbClr val="ffffff"/>
+                  </a:solidFill>
+                </a:uFill>
+                <a:latin typeface="Arial"/>
+              </a:rPr>
+              <a:t>但是在 </a:t>
+            </a:r>
+            <a:r>
+              <a:rPr b="0" lang="en-US" sz="1800" spc="-1" strike="noStrike">
+                <a:solidFill>
+                  <a:srgbClr val="000000"/>
+                </a:solidFill>
+                <a:uFill>
+                  <a:solidFill>
+                    <a:srgbClr val="ffffff"/>
+                  </a:solidFill>
+                </a:uFill>
+                <a:latin typeface="Arial"/>
+              </a:rPr>
+              <a:t>IF </a:t>
+            </a:r>
+            <a:r>
+              <a:rPr b="0" lang="en-US" sz="1800" spc="-1" strike="noStrike">
+                <a:solidFill>
+                  <a:srgbClr val="000000"/>
+                </a:solidFill>
+                <a:uFill>
+                  <a:solidFill>
+                    <a:srgbClr val="ffffff"/>
+                  </a:solidFill>
+                </a:uFill>
+                <a:latin typeface="Arial"/>
+              </a:rPr>
+              <a:t>控制语句中是直接使用变量名</a:t>
+            </a:r>
+            <a:endParaRPr b="0" lang="en-US" sz="1800" spc="-1" strike="noStrike">
+              <a:solidFill>
+                <a:srgbClr val="000000"/>
+              </a:solidFill>
+              <a:uFill>
+                <a:solidFill>
+                  <a:srgbClr val="ffffff"/>
+                </a:solidFill>
+              </a:uFill>
+              <a:latin typeface="Arial"/>
+            </a:endParaRPr>
+          </a:p>
+        </p:txBody>
+      </p:sp>
     </p:spTree>
   </p:cSld>
   <p:timing>
@@ -13132,7 +13319,7 @@
       </p:grpSpPr>
       <p:sp>
         <p:nvSpPr>
-          <p:cNvPr id="149" name="Line 1"/>
+          <p:cNvPr id="150" name="Line 1"/>
           <p:cNvSpPr/>
           <p:nvPr/>
         </p:nvSpPr>
@@ -13160,7 +13347,7 @@
       </p:sp>
       <p:sp>
         <p:nvSpPr>
-          <p:cNvPr id="150" name="Line 2"/>
+          <p:cNvPr id="151" name="Line 2"/>
           <p:cNvSpPr/>
           <p:nvPr/>
         </p:nvSpPr>
@@ -13188,14 +13375,14 @@
       </p:sp>
       <p:sp>
         <p:nvSpPr>
-          <p:cNvPr id="151" name="CustomShape 3"/>
+          <p:cNvPr id="152" name="CustomShape 3"/>
           <p:cNvSpPr/>
           <p:nvPr/>
         </p:nvSpPr>
         <p:spPr>
           <a:xfrm>
             <a:off x="342000" y="174240"/>
-            <a:ext cx="4435560" cy="975600"/>
+            <a:ext cx="4435200" cy="975240"/>
           </a:xfrm>
           <a:prstGeom prst="rect">
             <a:avLst/>
@@ -13265,7 +13452,7 @@
       </p:sp>
       <p:pic>
         <p:nvPicPr>
-          <p:cNvPr id="152" name="图片 142" descr=""/>
+          <p:cNvPr id="153" name="图片 142" descr=""/>
           <p:cNvPicPr/>
           <p:nvPr/>
         </p:nvPicPr>
@@ -13276,7 +13463,7 @@
         <p:spPr>
           <a:xfrm>
             <a:off x="7132680" y="174240"/>
-            <a:ext cx="1855080" cy="730800"/>
+            <a:ext cx="1854720" cy="730440"/>
           </a:xfrm>
           <a:prstGeom prst="rect">
             <a:avLst/>
@@ -13288,7 +13475,7 @@
       </p:pic>
       <p:pic>
         <p:nvPicPr>
-          <p:cNvPr id="153" name="图片 1" descr=""/>
+          <p:cNvPr id="154" name="图片 1" descr=""/>
           <p:cNvPicPr/>
           <p:nvPr/>
         </p:nvPicPr>
@@ -13299,7 +13486,7 @@
         <p:spPr>
           <a:xfrm>
             <a:off x="342000" y="1262880"/>
-            <a:ext cx="6012720" cy="3645720"/>
+            <a:ext cx="6012360" cy="3645360"/>
           </a:xfrm>
           <a:prstGeom prst="rect">
             <a:avLst/>

</xml_diff>